<commit_message>
started slides on hovering task
</commit_message>
<xml_diff>
--- a/Slides.pptx
+++ b/Slides.pptx
@@ -11,6 +11,11 @@
     <p:sldId id="259" r:id="rId5"/>
     <p:sldId id="260" r:id="rId6"/>
     <p:sldId id="261" r:id="rId7"/>
+    <p:sldId id="262" r:id="rId8"/>
+    <p:sldId id="263" r:id="rId9"/>
+    <p:sldId id="266" r:id="rId10"/>
+    <p:sldId id="265" r:id="rId11"/>
+    <p:sldId id="264" r:id="rId12"/>
   </p:sldIdLst>
   <p:sldSz cx="12192000" cy="6858000"/>
   <p:notesSz cx="6858000" cy="9144000"/>
@@ -109,6 +114,11 @@
       </a:defRPr>
     </a:lvl9pPr>
   </p:defaultTextStyle>
+  <p:extLst>
+    <p:ext uri="{EFAFB233-063F-42B5-8137-9DF3F51BA10A}">
+      <p15:sldGuideLst xmlns:p15="http://schemas.microsoft.com/office/powerpoint/2012/main"/>
+    </p:ext>
+  </p:extLst>
 </p:presentation>
 </file>
 
@@ -10855,7 +10865,7 @@
           <a:p>
             <a:fld id="{B3FBE7C8-F44F-46A4-ADFD-275A97E64713}" type="datetimeFigureOut">
               <a:rPr lang="it-IT" smtClean="0"/>
-              <a:t>22/08/2024</a:t>
+              <a:t>25/08/2024</a:t>
             </a:fld>
             <a:endParaRPr lang="it-IT"/>
           </a:p>
@@ -10909,7 +10919,7 @@
           <a:p>
             <a:fld id="{FD32C36A-C476-4D87-9FEE-A75765A1B5AE}" type="slidenum">
               <a:rPr lang="it-IT" smtClean="0"/>
-              <a:t>‹N›</a:t>
+              <a:t>‹#›</a:t>
             </a:fld>
             <a:endParaRPr lang="it-IT"/>
           </a:p>
@@ -11053,7 +11063,7 @@
           <a:p>
             <a:fld id="{B3FBE7C8-F44F-46A4-ADFD-275A97E64713}" type="datetimeFigureOut">
               <a:rPr lang="it-IT" smtClean="0"/>
-              <a:t>22/08/2024</a:t>
+              <a:t>25/08/2024</a:t>
             </a:fld>
             <a:endParaRPr lang="it-IT"/>
           </a:p>
@@ -11107,7 +11117,7 @@
           <a:p>
             <a:fld id="{FD32C36A-C476-4D87-9FEE-A75765A1B5AE}" type="slidenum">
               <a:rPr lang="it-IT" smtClean="0"/>
-              <a:t>‹N›</a:t>
+              <a:t>‹#›</a:t>
             </a:fld>
             <a:endParaRPr lang="it-IT"/>
           </a:p>
@@ -11261,7 +11271,7 @@
           <a:p>
             <a:fld id="{B3FBE7C8-F44F-46A4-ADFD-275A97E64713}" type="datetimeFigureOut">
               <a:rPr lang="it-IT" smtClean="0"/>
-              <a:t>22/08/2024</a:t>
+              <a:t>25/08/2024</a:t>
             </a:fld>
             <a:endParaRPr lang="it-IT"/>
           </a:p>
@@ -11315,7 +11325,7 @@
           <a:p>
             <a:fld id="{FD32C36A-C476-4D87-9FEE-A75765A1B5AE}" type="slidenum">
               <a:rPr lang="it-IT" smtClean="0"/>
-              <a:t>‹N›</a:t>
+              <a:t>‹#›</a:t>
             </a:fld>
             <a:endParaRPr lang="it-IT"/>
           </a:p>
@@ -11459,7 +11469,7 @@
           <a:p>
             <a:fld id="{B3FBE7C8-F44F-46A4-ADFD-275A97E64713}" type="datetimeFigureOut">
               <a:rPr lang="it-IT" smtClean="0"/>
-              <a:t>22/08/2024</a:t>
+              <a:t>25/08/2024</a:t>
             </a:fld>
             <a:endParaRPr lang="it-IT"/>
           </a:p>
@@ -11513,7 +11523,7 @@
           <a:p>
             <a:fld id="{FD32C36A-C476-4D87-9FEE-A75765A1B5AE}" type="slidenum">
               <a:rPr lang="it-IT" smtClean="0"/>
-              <a:t>‹N›</a:t>
+              <a:t>‹#›</a:t>
             </a:fld>
             <a:endParaRPr lang="it-IT"/>
           </a:p>
@@ -11734,7 +11744,7 @@
           <a:p>
             <a:fld id="{B3FBE7C8-F44F-46A4-ADFD-275A97E64713}" type="datetimeFigureOut">
               <a:rPr lang="it-IT" smtClean="0"/>
-              <a:t>22/08/2024</a:t>
+              <a:t>25/08/2024</a:t>
             </a:fld>
             <a:endParaRPr lang="it-IT"/>
           </a:p>
@@ -11788,7 +11798,7 @@
           <a:p>
             <a:fld id="{FD32C36A-C476-4D87-9FEE-A75765A1B5AE}" type="slidenum">
               <a:rPr lang="it-IT" smtClean="0"/>
-              <a:t>‹N›</a:t>
+              <a:t>‹#›</a:t>
             </a:fld>
             <a:endParaRPr lang="it-IT"/>
           </a:p>
@@ -11999,7 +12009,7 @@
           <a:p>
             <a:fld id="{B3FBE7C8-F44F-46A4-ADFD-275A97E64713}" type="datetimeFigureOut">
               <a:rPr lang="it-IT" smtClean="0"/>
-              <a:t>22/08/2024</a:t>
+              <a:t>25/08/2024</a:t>
             </a:fld>
             <a:endParaRPr lang="it-IT"/>
           </a:p>
@@ -12053,7 +12063,7 @@
           <a:p>
             <a:fld id="{FD32C36A-C476-4D87-9FEE-A75765A1B5AE}" type="slidenum">
               <a:rPr lang="it-IT" smtClean="0"/>
-              <a:t>‹N›</a:t>
+              <a:t>‹#›</a:t>
             </a:fld>
             <a:endParaRPr lang="it-IT"/>
           </a:p>
@@ -12411,7 +12421,7 @@
           <a:p>
             <a:fld id="{B3FBE7C8-F44F-46A4-ADFD-275A97E64713}" type="datetimeFigureOut">
               <a:rPr lang="it-IT" smtClean="0"/>
-              <a:t>22/08/2024</a:t>
+              <a:t>25/08/2024</a:t>
             </a:fld>
             <a:endParaRPr lang="it-IT"/>
           </a:p>
@@ -12465,7 +12475,7 @@
           <a:p>
             <a:fld id="{FD32C36A-C476-4D87-9FEE-A75765A1B5AE}" type="slidenum">
               <a:rPr lang="it-IT" smtClean="0"/>
-              <a:t>‹N›</a:t>
+              <a:t>‹#›</a:t>
             </a:fld>
             <a:endParaRPr lang="it-IT"/>
           </a:p>
@@ -12552,7 +12562,7 @@
           <a:p>
             <a:fld id="{B3FBE7C8-F44F-46A4-ADFD-275A97E64713}" type="datetimeFigureOut">
               <a:rPr lang="it-IT" smtClean="0"/>
-              <a:t>22/08/2024</a:t>
+              <a:t>25/08/2024</a:t>
             </a:fld>
             <a:endParaRPr lang="it-IT"/>
           </a:p>
@@ -12606,7 +12616,7 @@
           <a:p>
             <a:fld id="{FD32C36A-C476-4D87-9FEE-A75765A1B5AE}" type="slidenum">
               <a:rPr lang="it-IT" smtClean="0"/>
-              <a:t>‹N›</a:t>
+              <a:t>‹#›</a:t>
             </a:fld>
             <a:endParaRPr lang="it-IT"/>
           </a:p>
@@ -12665,7 +12675,7 @@
           <a:p>
             <a:fld id="{B3FBE7C8-F44F-46A4-ADFD-275A97E64713}" type="datetimeFigureOut">
               <a:rPr lang="it-IT" smtClean="0"/>
-              <a:t>22/08/2024</a:t>
+              <a:t>25/08/2024</a:t>
             </a:fld>
             <a:endParaRPr lang="it-IT"/>
           </a:p>
@@ -12719,7 +12729,7 @@
           <a:p>
             <a:fld id="{FD32C36A-C476-4D87-9FEE-A75765A1B5AE}" type="slidenum">
               <a:rPr lang="it-IT" smtClean="0"/>
-              <a:t>‹N›</a:t>
+              <a:t>‹#›</a:t>
             </a:fld>
             <a:endParaRPr lang="it-IT"/>
           </a:p>
@@ -12976,7 +12986,7 @@
           <a:p>
             <a:fld id="{B3FBE7C8-F44F-46A4-ADFD-275A97E64713}" type="datetimeFigureOut">
               <a:rPr lang="it-IT" smtClean="0"/>
-              <a:t>22/08/2024</a:t>
+              <a:t>25/08/2024</a:t>
             </a:fld>
             <a:endParaRPr lang="it-IT"/>
           </a:p>
@@ -13030,7 +13040,7 @@
           <a:p>
             <a:fld id="{FD32C36A-C476-4D87-9FEE-A75765A1B5AE}" type="slidenum">
               <a:rPr lang="it-IT" smtClean="0"/>
-              <a:t>‹N›</a:t>
+              <a:t>‹#›</a:t>
             </a:fld>
             <a:endParaRPr lang="it-IT"/>
           </a:p>
@@ -13264,7 +13274,7 @@
           <a:p>
             <a:fld id="{B3FBE7C8-F44F-46A4-ADFD-275A97E64713}" type="datetimeFigureOut">
               <a:rPr lang="it-IT" smtClean="0"/>
-              <a:t>22/08/2024</a:t>
+              <a:t>25/08/2024</a:t>
             </a:fld>
             <a:endParaRPr lang="it-IT"/>
           </a:p>
@@ -13318,7 +13328,7 @@
           <a:p>
             <a:fld id="{FD32C36A-C476-4D87-9FEE-A75765A1B5AE}" type="slidenum">
               <a:rPr lang="it-IT" smtClean="0"/>
-              <a:t>‹N›</a:t>
+              <a:t>‹#›</a:t>
             </a:fld>
             <a:endParaRPr lang="it-IT"/>
           </a:p>
@@ -13505,7 +13515,7 @@
           <a:p>
             <a:fld id="{B3FBE7C8-F44F-46A4-ADFD-275A97E64713}" type="datetimeFigureOut">
               <a:rPr lang="it-IT" smtClean="0"/>
-              <a:t>22/08/2024</a:t>
+              <a:t>25/08/2024</a:t>
             </a:fld>
             <a:endParaRPr lang="it-IT"/>
           </a:p>
@@ -13595,7 +13605,7 @@
           <a:p>
             <a:fld id="{FD32C36A-C476-4D87-9FEE-A75765A1B5AE}" type="slidenum">
               <a:rPr lang="it-IT" smtClean="0"/>
-              <a:t>‹N›</a:t>
+              <a:t>‹#›</a:t>
             </a:fld>
             <a:endParaRPr lang="it-IT"/>
           </a:p>
@@ -14694,6 +14704,678 @@
       <p:bldP spid="3" grpId="0" uiExpand="1" build="p"/>
     </p:bldLst>
   </p:timing>
+</p:sld>
+</file>
+
+<file path=ppt/slides/slide10.xml><?xml version="1.0" encoding="utf-8"?>
+<p:sld xmlns:a="http://schemas.openxmlformats.org/drawingml/2006/main" xmlns:r="http://schemas.openxmlformats.org/officeDocument/2006/relationships" xmlns:p="http://schemas.openxmlformats.org/presentationml/2006/main">
+  <p:cSld>
+    <p:spTree>
+      <p:nvGrpSpPr>
+        <p:cNvPr id="1" name=""/>
+        <p:cNvGrpSpPr/>
+        <p:nvPr/>
+      </p:nvGrpSpPr>
+      <p:grpSpPr>
+        <a:xfrm>
+          <a:off x="0" y="0"/>
+          <a:ext cx="0" cy="0"/>
+          <a:chOff x="0" y="0"/>
+          <a:chExt cx="0" cy="0"/>
+        </a:xfrm>
+      </p:grpSpPr>
+      <p:sp>
+        <p:nvSpPr>
+          <p:cNvPr id="2" name="Titolo 1">
+            <a:extLst>
+              <a:ext uri="{FF2B5EF4-FFF2-40B4-BE49-F238E27FC236}">
+                <a16:creationId xmlns:a16="http://schemas.microsoft.com/office/drawing/2014/main" id="{D5F58EEC-3A74-ACCB-9A51-3B63C7A951AF}"/>
+              </a:ext>
+            </a:extLst>
+          </p:cNvPr>
+          <p:cNvSpPr>
+            <a:spLocks noGrp="1"/>
+          </p:cNvSpPr>
+          <p:nvPr>
+            <p:ph type="title"/>
+          </p:nvPr>
+        </p:nvSpPr>
+        <p:spPr/>
+        <p:txBody>
+          <a:bodyPr>
+            <a:normAutofit/>
+          </a:bodyPr>
+          <a:lstStyle/>
+          <a:p>
+            <a:r>
+              <a:rPr lang="en-US" dirty="0">
+                <a:latin typeface="Aptos SemiBold" panose="020B0004020202020204" pitchFamily="34" charset="0"/>
+              </a:rPr>
+              <a:t>Reaching a target - Training</a:t>
+            </a:r>
+            <a:endParaRPr lang="it-IT" dirty="0">
+              <a:latin typeface="Aptos SemiBold" panose="020B0004020202020204" pitchFamily="34" charset="0"/>
+            </a:endParaRPr>
+          </a:p>
+        </p:txBody>
+      </p:sp>
+      <p:pic>
+        <p:nvPicPr>
+          <p:cNvPr id="4" name="Immagine 3">
+            <a:extLst>
+              <a:ext uri="{FF2B5EF4-FFF2-40B4-BE49-F238E27FC236}">
+                <a16:creationId xmlns:a16="http://schemas.microsoft.com/office/drawing/2014/main" id="{CB1FFB52-928C-7EDA-3C3B-6E1F60CA0E58}"/>
+              </a:ext>
+            </a:extLst>
+          </p:cNvPr>
+          <p:cNvPicPr>
+            <a:picLocks noChangeAspect="1"/>
+          </p:cNvPicPr>
+          <p:nvPr/>
+        </p:nvPicPr>
+        <p:blipFill>
+          <a:blip r:embed="rId2"/>
+          <a:stretch>
+            <a:fillRect/>
+          </a:stretch>
+        </p:blipFill>
+        <p:spPr>
+          <a:xfrm>
+            <a:off x="838200" y="1487928"/>
+            <a:ext cx="6142782" cy="36000"/>
+          </a:xfrm>
+          <a:prstGeom prst="rect">
+            <a:avLst/>
+          </a:prstGeom>
+        </p:spPr>
+      </p:pic>
+      <p:sp>
+        <p:nvSpPr>
+          <p:cNvPr id="5" name="Segnaposto contenuto 2">
+            <a:extLst>
+              <a:ext uri="{FF2B5EF4-FFF2-40B4-BE49-F238E27FC236}">
+                <a16:creationId xmlns:a16="http://schemas.microsoft.com/office/drawing/2014/main" id="{5C886F07-EA7B-3583-3F0E-C33A5A18A369}"/>
+              </a:ext>
+            </a:extLst>
+          </p:cNvPr>
+          <p:cNvSpPr txBox="1">
+            <a:spLocks/>
+          </p:cNvSpPr>
+          <p:nvPr/>
+        </p:nvSpPr>
+        <p:spPr>
+          <a:xfrm>
+            <a:off x="990600" y="1978025"/>
+            <a:ext cx="4172339" cy="4351338"/>
+          </a:xfrm>
+          <a:prstGeom prst="rect">
+            <a:avLst/>
+          </a:prstGeom>
+        </p:spPr>
+        <p:txBody>
+          <a:bodyPr vert="horz" lIns="91440" tIns="45720" rIns="91440" bIns="45720" rtlCol="0">
+            <a:normAutofit/>
+          </a:bodyPr>
+          <a:lstStyle>
+            <a:lvl1pPr marL="228600" indent="-228600" algn="l" defTabSz="914400" rtl="0" eaLnBrk="1" latinLnBrk="0" hangingPunct="1">
+              <a:lnSpc>
+                <a:spcPct val="90000"/>
+              </a:lnSpc>
+              <a:spcBef>
+                <a:spcPts val="1000"/>
+              </a:spcBef>
+              <a:buFont typeface="Arial" panose="020B0604020202020204" pitchFamily="34" charset="0"/>
+              <a:buChar char="•"/>
+              <a:defRPr sz="2800" kern="1200">
+                <a:solidFill>
+                  <a:schemeClr val="tx1"/>
+                </a:solidFill>
+                <a:latin typeface="+mn-lt"/>
+                <a:ea typeface="+mn-ea"/>
+                <a:cs typeface="+mn-cs"/>
+              </a:defRPr>
+            </a:lvl1pPr>
+            <a:lvl2pPr marL="685800" indent="-228600" algn="l" defTabSz="914400" rtl="0" eaLnBrk="1" latinLnBrk="0" hangingPunct="1">
+              <a:lnSpc>
+                <a:spcPct val="90000"/>
+              </a:lnSpc>
+              <a:spcBef>
+                <a:spcPts val="500"/>
+              </a:spcBef>
+              <a:buFont typeface="Arial" panose="020B0604020202020204" pitchFamily="34" charset="0"/>
+              <a:buChar char="•"/>
+              <a:defRPr sz="2400" kern="1200">
+                <a:solidFill>
+                  <a:schemeClr val="tx1"/>
+                </a:solidFill>
+                <a:latin typeface="+mn-lt"/>
+                <a:ea typeface="+mn-ea"/>
+                <a:cs typeface="+mn-cs"/>
+              </a:defRPr>
+            </a:lvl2pPr>
+            <a:lvl3pPr marL="1143000" indent="-228600" algn="l" defTabSz="914400" rtl="0" eaLnBrk="1" latinLnBrk="0" hangingPunct="1">
+              <a:lnSpc>
+                <a:spcPct val="90000"/>
+              </a:lnSpc>
+              <a:spcBef>
+                <a:spcPts val="500"/>
+              </a:spcBef>
+              <a:buFont typeface="Arial" panose="020B0604020202020204" pitchFamily="34" charset="0"/>
+              <a:buChar char="•"/>
+              <a:defRPr sz="2000" kern="1200">
+                <a:solidFill>
+                  <a:schemeClr val="tx1"/>
+                </a:solidFill>
+                <a:latin typeface="+mn-lt"/>
+                <a:ea typeface="+mn-ea"/>
+                <a:cs typeface="+mn-cs"/>
+              </a:defRPr>
+            </a:lvl3pPr>
+            <a:lvl4pPr marL="1600200" indent="-228600" algn="l" defTabSz="914400" rtl="0" eaLnBrk="1" latinLnBrk="0" hangingPunct="1">
+              <a:lnSpc>
+                <a:spcPct val="90000"/>
+              </a:lnSpc>
+              <a:spcBef>
+                <a:spcPts val="500"/>
+              </a:spcBef>
+              <a:buFont typeface="Arial" panose="020B0604020202020204" pitchFamily="34" charset="0"/>
+              <a:buChar char="•"/>
+              <a:defRPr sz="1800" kern="1200">
+                <a:solidFill>
+                  <a:schemeClr val="tx1"/>
+                </a:solidFill>
+                <a:latin typeface="+mn-lt"/>
+                <a:ea typeface="+mn-ea"/>
+                <a:cs typeface="+mn-cs"/>
+              </a:defRPr>
+            </a:lvl4pPr>
+            <a:lvl5pPr marL="2057400" indent="-228600" algn="l" defTabSz="914400" rtl="0" eaLnBrk="1" latinLnBrk="0" hangingPunct="1">
+              <a:lnSpc>
+                <a:spcPct val="90000"/>
+              </a:lnSpc>
+              <a:spcBef>
+                <a:spcPts val="500"/>
+              </a:spcBef>
+              <a:buFont typeface="Arial" panose="020B0604020202020204" pitchFamily="34" charset="0"/>
+              <a:buChar char="•"/>
+              <a:defRPr sz="1800" kern="1200">
+                <a:solidFill>
+                  <a:schemeClr val="tx1"/>
+                </a:solidFill>
+                <a:latin typeface="+mn-lt"/>
+                <a:ea typeface="+mn-ea"/>
+                <a:cs typeface="+mn-cs"/>
+              </a:defRPr>
+            </a:lvl5pPr>
+            <a:lvl6pPr marL="2514600" indent="-228600" algn="l" defTabSz="914400" rtl="0" eaLnBrk="1" latinLnBrk="0" hangingPunct="1">
+              <a:lnSpc>
+                <a:spcPct val="90000"/>
+              </a:lnSpc>
+              <a:spcBef>
+                <a:spcPts val="500"/>
+              </a:spcBef>
+              <a:buFont typeface="Arial" panose="020B0604020202020204" pitchFamily="34" charset="0"/>
+              <a:buChar char="•"/>
+              <a:defRPr sz="1800" kern="1200">
+                <a:solidFill>
+                  <a:schemeClr val="tx1"/>
+                </a:solidFill>
+                <a:latin typeface="+mn-lt"/>
+                <a:ea typeface="+mn-ea"/>
+                <a:cs typeface="+mn-cs"/>
+              </a:defRPr>
+            </a:lvl6pPr>
+            <a:lvl7pPr marL="2971800" indent="-228600" algn="l" defTabSz="914400" rtl="0" eaLnBrk="1" latinLnBrk="0" hangingPunct="1">
+              <a:lnSpc>
+                <a:spcPct val="90000"/>
+              </a:lnSpc>
+              <a:spcBef>
+                <a:spcPts val="500"/>
+              </a:spcBef>
+              <a:buFont typeface="Arial" panose="020B0604020202020204" pitchFamily="34" charset="0"/>
+              <a:buChar char="•"/>
+              <a:defRPr sz="1800" kern="1200">
+                <a:solidFill>
+                  <a:schemeClr val="tx1"/>
+                </a:solidFill>
+                <a:latin typeface="+mn-lt"/>
+                <a:ea typeface="+mn-ea"/>
+                <a:cs typeface="+mn-cs"/>
+              </a:defRPr>
+            </a:lvl7pPr>
+            <a:lvl8pPr marL="3429000" indent="-228600" algn="l" defTabSz="914400" rtl="0" eaLnBrk="1" latinLnBrk="0" hangingPunct="1">
+              <a:lnSpc>
+                <a:spcPct val="90000"/>
+              </a:lnSpc>
+              <a:spcBef>
+                <a:spcPts val="500"/>
+              </a:spcBef>
+              <a:buFont typeface="Arial" panose="020B0604020202020204" pitchFamily="34" charset="0"/>
+              <a:buChar char="•"/>
+              <a:defRPr sz="1800" kern="1200">
+                <a:solidFill>
+                  <a:schemeClr val="tx1"/>
+                </a:solidFill>
+                <a:latin typeface="+mn-lt"/>
+                <a:ea typeface="+mn-ea"/>
+                <a:cs typeface="+mn-cs"/>
+              </a:defRPr>
+            </a:lvl8pPr>
+            <a:lvl9pPr marL="3886200" indent="-228600" algn="l" defTabSz="914400" rtl="0" eaLnBrk="1" latinLnBrk="0" hangingPunct="1">
+              <a:lnSpc>
+                <a:spcPct val="90000"/>
+              </a:lnSpc>
+              <a:spcBef>
+                <a:spcPts val="500"/>
+              </a:spcBef>
+              <a:buFont typeface="Arial" panose="020B0604020202020204" pitchFamily="34" charset="0"/>
+              <a:buChar char="•"/>
+              <a:defRPr sz="1800" kern="1200">
+                <a:solidFill>
+                  <a:schemeClr val="tx1"/>
+                </a:solidFill>
+                <a:latin typeface="+mn-lt"/>
+                <a:ea typeface="+mn-ea"/>
+                <a:cs typeface="+mn-cs"/>
+              </a:defRPr>
+            </a:lvl9pPr>
+          </a:lstStyle>
+          <a:p>
+            <a:endParaRPr lang="it-IT" sz="2400"/>
+          </a:p>
+          <a:p>
+            <a:endParaRPr lang="it-IT"/>
+          </a:p>
+          <a:p>
+            <a:endParaRPr lang="it-IT"/>
+          </a:p>
+          <a:p>
+            <a:endParaRPr lang="it-IT" dirty="0"/>
+          </a:p>
+        </p:txBody>
+      </p:sp>
+      <p:sp>
+        <p:nvSpPr>
+          <p:cNvPr id="3" name="TextBox 2">
+            <a:extLst>
+              <a:ext uri="{FF2B5EF4-FFF2-40B4-BE49-F238E27FC236}">
+                <a16:creationId xmlns:a16="http://schemas.microsoft.com/office/drawing/2014/main" id="{9B17E83E-9D73-72CD-E400-791ACD41A8E7}"/>
+              </a:ext>
+            </a:extLst>
+          </p:cNvPr>
+          <p:cNvSpPr txBox="1"/>
+          <p:nvPr/>
+        </p:nvSpPr>
+        <p:spPr>
+          <a:xfrm>
+            <a:off x="6484562" y="3784362"/>
+            <a:ext cx="4936864" cy="369332"/>
+          </a:xfrm>
+          <a:prstGeom prst="rect">
+            <a:avLst/>
+          </a:prstGeom>
+          <a:noFill/>
+        </p:spPr>
+        <p:txBody>
+          <a:bodyPr wrap="none" rtlCol="0">
+            <a:spAutoFit/>
+          </a:bodyPr>
+          <a:lstStyle/>
+          <a:p>
+            <a:r>
+              <a:rPr lang="en-US" dirty="0"/>
+              <a:t>INSERIRE SCREENSHOTS REWARDS DA WANDB</a:t>
+            </a:r>
+            <a:endParaRPr lang="it-IT" dirty="0"/>
+          </a:p>
+        </p:txBody>
+      </p:sp>
+    </p:spTree>
+    <p:extLst>
+      <p:ext uri="{BB962C8B-B14F-4D97-AF65-F5344CB8AC3E}">
+        <p14:creationId xmlns:p14="http://schemas.microsoft.com/office/powerpoint/2010/main" val="2937244552"/>
+      </p:ext>
+    </p:extLst>
+  </p:cSld>
+  <p:clrMapOvr>
+    <a:masterClrMapping/>
+  </p:clrMapOvr>
+</p:sld>
+</file>
+
+<file path=ppt/slides/slide11.xml><?xml version="1.0" encoding="utf-8"?>
+<p:sld xmlns:a="http://schemas.openxmlformats.org/drawingml/2006/main" xmlns:r="http://schemas.openxmlformats.org/officeDocument/2006/relationships" xmlns:p="http://schemas.openxmlformats.org/presentationml/2006/main">
+  <p:cSld>
+    <p:spTree>
+      <p:nvGrpSpPr>
+        <p:cNvPr id="1" name=""/>
+        <p:cNvGrpSpPr/>
+        <p:nvPr/>
+      </p:nvGrpSpPr>
+      <p:grpSpPr>
+        <a:xfrm>
+          <a:off x="0" y="0"/>
+          <a:ext cx="0" cy="0"/>
+          <a:chOff x="0" y="0"/>
+          <a:chExt cx="0" cy="0"/>
+        </a:xfrm>
+      </p:grpSpPr>
+      <p:sp>
+        <p:nvSpPr>
+          <p:cNvPr id="2" name="Titolo 1">
+            <a:extLst>
+              <a:ext uri="{FF2B5EF4-FFF2-40B4-BE49-F238E27FC236}">
+                <a16:creationId xmlns:a16="http://schemas.microsoft.com/office/drawing/2014/main" id="{D5F58EEC-3A74-ACCB-9A51-3B63C7A951AF}"/>
+              </a:ext>
+            </a:extLst>
+          </p:cNvPr>
+          <p:cNvSpPr>
+            <a:spLocks noGrp="1"/>
+          </p:cNvSpPr>
+          <p:nvPr>
+            <p:ph type="title"/>
+          </p:nvPr>
+        </p:nvSpPr>
+        <p:spPr/>
+        <p:txBody>
+          <a:bodyPr>
+            <a:normAutofit/>
+          </a:bodyPr>
+          <a:lstStyle/>
+          <a:p>
+            <a:r>
+              <a:rPr lang="en-US" dirty="0">
+                <a:latin typeface="Aptos SemiBold" panose="020B0004020202020204" pitchFamily="34" charset="0"/>
+              </a:rPr>
+              <a:t>Reaching a target - Demo</a:t>
+            </a:r>
+            <a:endParaRPr lang="it-IT" dirty="0">
+              <a:latin typeface="Aptos SemiBold" panose="020B0004020202020204" pitchFamily="34" charset="0"/>
+            </a:endParaRPr>
+          </a:p>
+        </p:txBody>
+      </p:sp>
+      <p:pic>
+        <p:nvPicPr>
+          <p:cNvPr id="4" name="Immagine 3">
+            <a:extLst>
+              <a:ext uri="{FF2B5EF4-FFF2-40B4-BE49-F238E27FC236}">
+                <a16:creationId xmlns:a16="http://schemas.microsoft.com/office/drawing/2014/main" id="{CB1FFB52-928C-7EDA-3C3B-6E1F60CA0E58}"/>
+              </a:ext>
+            </a:extLst>
+          </p:cNvPr>
+          <p:cNvPicPr>
+            <a:picLocks noChangeAspect="1"/>
+          </p:cNvPicPr>
+          <p:nvPr/>
+        </p:nvPicPr>
+        <p:blipFill>
+          <a:blip r:embed="rId2"/>
+          <a:stretch>
+            <a:fillRect/>
+          </a:stretch>
+        </p:blipFill>
+        <p:spPr>
+          <a:xfrm>
+            <a:off x="838200" y="1487928"/>
+            <a:ext cx="6142782" cy="36000"/>
+          </a:xfrm>
+          <a:prstGeom prst="rect">
+            <a:avLst/>
+          </a:prstGeom>
+        </p:spPr>
+      </p:pic>
+      <p:sp>
+        <p:nvSpPr>
+          <p:cNvPr id="5" name="Segnaposto contenuto 2">
+            <a:extLst>
+              <a:ext uri="{FF2B5EF4-FFF2-40B4-BE49-F238E27FC236}">
+                <a16:creationId xmlns:a16="http://schemas.microsoft.com/office/drawing/2014/main" id="{5C886F07-EA7B-3583-3F0E-C33A5A18A369}"/>
+              </a:ext>
+            </a:extLst>
+          </p:cNvPr>
+          <p:cNvSpPr txBox="1">
+            <a:spLocks/>
+          </p:cNvSpPr>
+          <p:nvPr/>
+        </p:nvSpPr>
+        <p:spPr>
+          <a:xfrm>
+            <a:off x="990600" y="1978025"/>
+            <a:ext cx="4172339" cy="4351338"/>
+          </a:xfrm>
+          <a:prstGeom prst="rect">
+            <a:avLst/>
+          </a:prstGeom>
+        </p:spPr>
+        <p:txBody>
+          <a:bodyPr vert="horz" lIns="91440" tIns="45720" rIns="91440" bIns="45720" rtlCol="0">
+            <a:normAutofit/>
+          </a:bodyPr>
+          <a:lstStyle>
+            <a:lvl1pPr marL="228600" indent="-228600" algn="l" defTabSz="914400" rtl="0" eaLnBrk="1" latinLnBrk="0" hangingPunct="1">
+              <a:lnSpc>
+                <a:spcPct val="90000"/>
+              </a:lnSpc>
+              <a:spcBef>
+                <a:spcPts val="1000"/>
+              </a:spcBef>
+              <a:buFont typeface="Arial" panose="020B0604020202020204" pitchFamily="34" charset="0"/>
+              <a:buChar char="•"/>
+              <a:defRPr sz="2800" kern="1200">
+                <a:solidFill>
+                  <a:schemeClr val="tx1"/>
+                </a:solidFill>
+                <a:latin typeface="+mn-lt"/>
+                <a:ea typeface="+mn-ea"/>
+                <a:cs typeface="+mn-cs"/>
+              </a:defRPr>
+            </a:lvl1pPr>
+            <a:lvl2pPr marL="685800" indent="-228600" algn="l" defTabSz="914400" rtl="0" eaLnBrk="1" latinLnBrk="0" hangingPunct="1">
+              <a:lnSpc>
+                <a:spcPct val="90000"/>
+              </a:lnSpc>
+              <a:spcBef>
+                <a:spcPts val="500"/>
+              </a:spcBef>
+              <a:buFont typeface="Arial" panose="020B0604020202020204" pitchFamily="34" charset="0"/>
+              <a:buChar char="•"/>
+              <a:defRPr sz="2400" kern="1200">
+                <a:solidFill>
+                  <a:schemeClr val="tx1"/>
+                </a:solidFill>
+                <a:latin typeface="+mn-lt"/>
+                <a:ea typeface="+mn-ea"/>
+                <a:cs typeface="+mn-cs"/>
+              </a:defRPr>
+            </a:lvl2pPr>
+            <a:lvl3pPr marL="1143000" indent="-228600" algn="l" defTabSz="914400" rtl="0" eaLnBrk="1" latinLnBrk="0" hangingPunct="1">
+              <a:lnSpc>
+                <a:spcPct val="90000"/>
+              </a:lnSpc>
+              <a:spcBef>
+                <a:spcPts val="500"/>
+              </a:spcBef>
+              <a:buFont typeface="Arial" panose="020B0604020202020204" pitchFamily="34" charset="0"/>
+              <a:buChar char="•"/>
+              <a:defRPr sz="2000" kern="1200">
+                <a:solidFill>
+                  <a:schemeClr val="tx1"/>
+                </a:solidFill>
+                <a:latin typeface="+mn-lt"/>
+                <a:ea typeface="+mn-ea"/>
+                <a:cs typeface="+mn-cs"/>
+              </a:defRPr>
+            </a:lvl3pPr>
+            <a:lvl4pPr marL="1600200" indent="-228600" algn="l" defTabSz="914400" rtl="0" eaLnBrk="1" latinLnBrk="0" hangingPunct="1">
+              <a:lnSpc>
+                <a:spcPct val="90000"/>
+              </a:lnSpc>
+              <a:spcBef>
+                <a:spcPts val="500"/>
+              </a:spcBef>
+              <a:buFont typeface="Arial" panose="020B0604020202020204" pitchFamily="34" charset="0"/>
+              <a:buChar char="•"/>
+              <a:defRPr sz="1800" kern="1200">
+                <a:solidFill>
+                  <a:schemeClr val="tx1"/>
+                </a:solidFill>
+                <a:latin typeface="+mn-lt"/>
+                <a:ea typeface="+mn-ea"/>
+                <a:cs typeface="+mn-cs"/>
+              </a:defRPr>
+            </a:lvl4pPr>
+            <a:lvl5pPr marL="2057400" indent="-228600" algn="l" defTabSz="914400" rtl="0" eaLnBrk="1" latinLnBrk="0" hangingPunct="1">
+              <a:lnSpc>
+                <a:spcPct val="90000"/>
+              </a:lnSpc>
+              <a:spcBef>
+                <a:spcPts val="500"/>
+              </a:spcBef>
+              <a:buFont typeface="Arial" panose="020B0604020202020204" pitchFamily="34" charset="0"/>
+              <a:buChar char="•"/>
+              <a:defRPr sz="1800" kern="1200">
+                <a:solidFill>
+                  <a:schemeClr val="tx1"/>
+                </a:solidFill>
+                <a:latin typeface="+mn-lt"/>
+                <a:ea typeface="+mn-ea"/>
+                <a:cs typeface="+mn-cs"/>
+              </a:defRPr>
+            </a:lvl5pPr>
+            <a:lvl6pPr marL="2514600" indent="-228600" algn="l" defTabSz="914400" rtl="0" eaLnBrk="1" latinLnBrk="0" hangingPunct="1">
+              <a:lnSpc>
+                <a:spcPct val="90000"/>
+              </a:lnSpc>
+              <a:spcBef>
+                <a:spcPts val="500"/>
+              </a:spcBef>
+              <a:buFont typeface="Arial" panose="020B0604020202020204" pitchFamily="34" charset="0"/>
+              <a:buChar char="•"/>
+              <a:defRPr sz="1800" kern="1200">
+                <a:solidFill>
+                  <a:schemeClr val="tx1"/>
+                </a:solidFill>
+                <a:latin typeface="+mn-lt"/>
+                <a:ea typeface="+mn-ea"/>
+                <a:cs typeface="+mn-cs"/>
+              </a:defRPr>
+            </a:lvl6pPr>
+            <a:lvl7pPr marL="2971800" indent="-228600" algn="l" defTabSz="914400" rtl="0" eaLnBrk="1" latinLnBrk="0" hangingPunct="1">
+              <a:lnSpc>
+                <a:spcPct val="90000"/>
+              </a:lnSpc>
+              <a:spcBef>
+                <a:spcPts val="500"/>
+              </a:spcBef>
+              <a:buFont typeface="Arial" panose="020B0604020202020204" pitchFamily="34" charset="0"/>
+              <a:buChar char="•"/>
+              <a:defRPr sz="1800" kern="1200">
+                <a:solidFill>
+                  <a:schemeClr val="tx1"/>
+                </a:solidFill>
+                <a:latin typeface="+mn-lt"/>
+                <a:ea typeface="+mn-ea"/>
+                <a:cs typeface="+mn-cs"/>
+              </a:defRPr>
+            </a:lvl7pPr>
+            <a:lvl8pPr marL="3429000" indent="-228600" algn="l" defTabSz="914400" rtl="0" eaLnBrk="1" latinLnBrk="0" hangingPunct="1">
+              <a:lnSpc>
+                <a:spcPct val="90000"/>
+              </a:lnSpc>
+              <a:spcBef>
+                <a:spcPts val="500"/>
+              </a:spcBef>
+              <a:buFont typeface="Arial" panose="020B0604020202020204" pitchFamily="34" charset="0"/>
+              <a:buChar char="•"/>
+              <a:defRPr sz="1800" kern="1200">
+                <a:solidFill>
+                  <a:schemeClr val="tx1"/>
+                </a:solidFill>
+                <a:latin typeface="+mn-lt"/>
+                <a:ea typeface="+mn-ea"/>
+                <a:cs typeface="+mn-cs"/>
+              </a:defRPr>
+            </a:lvl8pPr>
+            <a:lvl9pPr marL="3886200" indent="-228600" algn="l" defTabSz="914400" rtl="0" eaLnBrk="1" latinLnBrk="0" hangingPunct="1">
+              <a:lnSpc>
+                <a:spcPct val="90000"/>
+              </a:lnSpc>
+              <a:spcBef>
+                <a:spcPts val="500"/>
+              </a:spcBef>
+              <a:buFont typeface="Arial" panose="020B0604020202020204" pitchFamily="34" charset="0"/>
+              <a:buChar char="•"/>
+              <a:defRPr sz="1800" kern="1200">
+                <a:solidFill>
+                  <a:schemeClr val="tx1"/>
+                </a:solidFill>
+                <a:latin typeface="+mn-lt"/>
+                <a:ea typeface="+mn-ea"/>
+                <a:cs typeface="+mn-cs"/>
+              </a:defRPr>
+            </a:lvl9pPr>
+          </a:lstStyle>
+          <a:p>
+            <a:endParaRPr lang="it-IT" sz="2400"/>
+          </a:p>
+          <a:p>
+            <a:endParaRPr lang="it-IT"/>
+          </a:p>
+          <a:p>
+            <a:endParaRPr lang="it-IT"/>
+          </a:p>
+          <a:p>
+            <a:endParaRPr lang="it-IT" dirty="0"/>
+          </a:p>
+        </p:txBody>
+      </p:sp>
+      <p:sp>
+        <p:nvSpPr>
+          <p:cNvPr id="3" name="TextBox 2">
+            <a:extLst>
+              <a:ext uri="{FF2B5EF4-FFF2-40B4-BE49-F238E27FC236}">
+                <a16:creationId xmlns:a16="http://schemas.microsoft.com/office/drawing/2014/main" id="{A96DD8EA-71A7-8BA4-4BF3-406CCD259B4B}"/>
+              </a:ext>
+            </a:extLst>
+          </p:cNvPr>
+          <p:cNvSpPr txBox="1"/>
+          <p:nvPr/>
+        </p:nvSpPr>
+        <p:spPr>
+          <a:xfrm>
+            <a:off x="3683961" y="3784362"/>
+            <a:ext cx="4824078" cy="369332"/>
+          </a:xfrm>
+          <a:prstGeom prst="rect">
+            <a:avLst/>
+          </a:prstGeom>
+          <a:noFill/>
+        </p:spPr>
+        <p:txBody>
+          <a:bodyPr wrap="none" rtlCol="0">
+            <a:spAutoFit/>
+          </a:bodyPr>
+          <a:lstStyle/>
+          <a:p>
+            <a:r>
+              <a:rPr lang="en-US" dirty="0"/>
+              <a:t>INSERIRE VIDEO DRONE VERSO PALLA GIALLA</a:t>
+            </a:r>
+            <a:endParaRPr lang="it-IT" dirty="0"/>
+          </a:p>
+        </p:txBody>
+      </p:sp>
+    </p:spTree>
+    <p:extLst>
+      <p:ext uri="{BB962C8B-B14F-4D97-AF65-F5344CB8AC3E}">
+        <p14:creationId xmlns:p14="http://schemas.microsoft.com/office/powerpoint/2010/main" val="2751902850"/>
+      </p:ext>
+    </p:extLst>
+  </p:cSld>
+  <p:clrMapOvr>
+    <a:masterClrMapping/>
+  </p:clrMapOvr>
 </p:sld>
 </file>
 
@@ -16584,6 +17266,1985 @@
 </p:sld>
 </file>
 
+<file path=ppt/slides/slide7.xml><?xml version="1.0" encoding="utf-8"?>
+<p:sld xmlns:a="http://schemas.openxmlformats.org/drawingml/2006/main" xmlns:r="http://schemas.openxmlformats.org/officeDocument/2006/relationships" xmlns:p="http://schemas.openxmlformats.org/presentationml/2006/main">
+  <p:cSld>
+    <p:spTree>
+      <p:nvGrpSpPr>
+        <p:cNvPr id="1" name=""/>
+        <p:cNvGrpSpPr/>
+        <p:nvPr/>
+      </p:nvGrpSpPr>
+      <p:grpSpPr>
+        <a:xfrm>
+          <a:off x="0" y="0"/>
+          <a:ext cx="0" cy="0"/>
+          <a:chOff x="0" y="0"/>
+          <a:chExt cx="0" cy="0"/>
+        </a:xfrm>
+      </p:grpSpPr>
+      <p:sp>
+        <p:nvSpPr>
+          <p:cNvPr id="29" name="Rectangle: Rounded Corners 28">
+            <a:extLst>
+              <a:ext uri="{FF2B5EF4-FFF2-40B4-BE49-F238E27FC236}">
+                <a16:creationId xmlns:a16="http://schemas.microsoft.com/office/drawing/2014/main" id="{05A4C8F8-68D7-A96F-DE76-40D66292F7DE}"/>
+              </a:ext>
+            </a:extLst>
+          </p:cNvPr>
+          <p:cNvSpPr/>
+          <p:nvPr/>
+        </p:nvSpPr>
+        <p:spPr>
+          <a:xfrm>
+            <a:off x="990599" y="4533830"/>
+            <a:ext cx="2052747" cy="1058078"/>
+          </a:xfrm>
+          <a:prstGeom prst="roundRect">
+            <a:avLst>
+              <a:gd name="adj" fmla="val 8957"/>
+            </a:avLst>
+          </a:prstGeom>
+        </p:spPr>
+        <p:style>
+          <a:lnRef idx="2">
+            <a:schemeClr val="accent1"/>
+          </a:lnRef>
+          <a:fillRef idx="1">
+            <a:schemeClr val="lt1"/>
+          </a:fillRef>
+          <a:effectRef idx="0">
+            <a:schemeClr val="accent1"/>
+          </a:effectRef>
+          <a:fontRef idx="minor">
+            <a:schemeClr val="dk1"/>
+          </a:fontRef>
+        </p:style>
+        <p:txBody>
+          <a:bodyPr rtlCol="0" anchor="ctr"/>
+          <a:lstStyle/>
+          <a:p>
+            <a:pPr algn="ctr"/>
+            <a:endParaRPr lang="it-IT"/>
+          </a:p>
+        </p:txBody>
+      </p:sp>
+      <p:sp>
+        <p:nvSpPr>
+          <p:cNvPr id="23" name="Rectangle: Rounded Corners 22">
+            <a:extLst>
+              <a:ext uri="{FF2B5EF4-FFF2-40B4-BE49-F238E27FC236}">
+                <a16:creationId xmlns:a16="http://schemas.microsoft.com/office/drawing/2014/main" id="{515DD610-6B14-46E1-5143-41775D29E50B}"/>
+              </a:ext>
+            </a:extLst>
+          </p:cNvPr>
+          <p:cNvSpPr/>
+          <p:nvPr/>
+        </p:nvSpPr>
+        <p:spPr>
+          <a:xfrm>
+            <a:off x="3760750" y="4533830"/>
+            <a:ext cx="2052747" cy="2070170"/>
+          </a:xfrm>
+          <a:prstGeom prst="roundRect">
+            <a:avLst>
+              <a:gd name="adj" fmla="val 8957"/>
+            </a:avLst>
+          </a:prstGeom>
+        </p:spPr>
+        <p:style>
+          <a:lnRef idx="2">
+            <a:schemeClr val="accent1"/>
+          </a:lnRef>
+          <a:fillRef idx="1">
+            <a:schemeClr val="lt1"/>
+          </a:fillRef>
+          <a:effectRef idx="0">
+            <a:schemeClr val="accent1"/>
+          </a:effectRef>
+          <a:fontRef idx="minor">
+            <a:schemeClr val="dk1"/>
+          </a:fontRef>
+        </p:style>
+        <p:txBody>
+          <a:bodyPr rtlCol="0" anchor="ctr"/>
+          <a:lstStyle/>
+          <a:p>
+            <a:pPr algn="ctr"/>
+            <a:endParaRPr lang="it-IT"/>
+          </a:p>
+        </p:txBody>
+      </p:sp>
+      <p:sp>
+        <p:nvSpPr>
+          <p:cNvPr id="2" name="Titolo 1">
+            <a:extLst>
+              <a:ext uri="{FF2B5EF4-FFF2-40B4-BE49-F238E27FC236}">
+                <a16:creationId xmlns:a16="http://schemas.microsoft.com/office/drawing/2014/main" id="{D5F58EEC-3A74-ACCB-9A51-3B63C7A951AF}"/>
+              </a:ext>
+            </a:extLst>
+          </p:cNvPr>
+          <p:cNvSpPr>
+            <a:spLocks noGrp="1"/>
+          </p:cNvSpPr>
+          <p:nvPr>
+            <p:ph type="title"/>
+          </p:nvPr>
+        </p:nvSpPr>
+        <p:spPr/>
+        <p:txBody>
+          <a:bodyPr>
+            <a:normAutofit/>
+          </a:bodyPr>
+          <a:lstStyle/>
+          <a:p>
+            <a:r>
+              <a:rPr lang="en-US" dirty="0">
+                <a:latin typeface="Aptos SemiBold" panose="020B0004020202020204" pitchFamily="34" charset="0"/>
+              </a:rPr>
+              <a:t>Reaching a target</a:t>
+            </a:r>
+            <a:endParaRPr lang="it-IT" dirty="0">
+              <a:latin typeface="Aptos SemiBold" panose="020B0004020202020204" pitchFamily="34" charset="0"/>
+            </a:endParaRPr>
+          </a:p>
+        </p:txBody>
+      </p:sp>
+      <p:pic>
+        <p:nvPicPr>
+          <p:cNvPr id="4" name="Immagine 3">
+            <a:extLst>
+              <a:ext uri="{FF2B5EF4-FFF2-40B4-BE49-F238E27FC236}">
+                <a16:creationId xmlns:a16="http://schemas.microsoft.com/office/drawing/2014/main" id="{CB1FFB52-928C-7EDA-3C3B-6E1F60CA0E58}"/>
+              </a:ext>
+            </a:extLst>
+          </p:cNvPr>
+          <p:cNvPicPr>
+            <a:picLocks noChangeAspect="1"/>
+          </p:cNvPicPr>
+          <p:nvPr/>
+        </p:nvPicPr>
+        <p:blipFill>
+          <a:blip r:embed="rId2"/>
+          <a:stretch>
+            <a:fillRect/>
+          </a:stretch>
+        </p:blipFill>
+        <p:spPr>
+          <a:xfrm>
+            <a:off x="838200" y="1487928"/>
+            <a:ext cx="6142782" cy="36000"/>
+          </a:xfrm>
+          <a:prstGeom prst="rect">
+            <a:avLst/>
+          </a:prstGeom>
+        </p:spPr>
+      </p:pic>
+      <p:sp>
+        <p:nvSpPr>
+          <p:cNvPr id="3" name="TextBox 2">
+            <a:extLst>
+              <a:ext uri="{FF2B5EF4-FFF2-40B4-BE49-F238E27FC236}">
+                <a16:creationId xmlns:a16="http://schemas.microsoft.com/office/drawing/2014/main" id="{4DB6C189-730F-9BDD-F9FB-441DC7D76FA0}"/>
+              </a:ext>
+            </a:extLst>
+          </p:cNvPr>
+          <p:cNvSpPr txBox="1"/>
+          <p:nvPr/>
+        </p:nvSpPr>
+        <p:spPr>
+          <a:xfrm>
+            <a:off x="838200" y="1870681"/>
+            <a:ext cx="10515600" cy="646331"/>
+          </a:xfrm>
+          <a:prstGeom prst="rect">
+            <a:avLst/>
+          </a:prstGeom>
+          <a:noFill/>
+        </p:spPr>
+        <p:txBody>
+          <a:bodyPr wrap="square" rtlCol="0">
+            <a:spAutoFit/>
+          </a:bodyPr>
+          <a:lstStyle/>
+          <a:p>
+            <a:r>
+              <a:rPr lang="en-US" dirty="0"/>
+              <a:t>Goal: reach a yellow sphere in a simulated rectangular room while avoiding collision with either the walls or the floor and without excessive movements</a:t>
+            </a:r>
+            <a:endParaRPr lang="it-IT" dirty="0"/>
+          </a:p>
+        </p:txBody>
+      </p:sp>
+      <p:sp>
+        <p:nvSpPr>
+          <p:cNvPr id="6" name="Rectangle: Rounded Corners 5">
+            <a:extLst>
+              <a:ext uri="{FF2B5EF4-FFF2-40B4-BE49-F238E27FC236}">
+                <a16:creationId xmlns:a16="http://schemas.microsoft.com/office/drawing/2014/main" id="{55CC621B-F4F5-D4F2-5F7D-AC4D091C4CEF}"/>
+              </a:ext>
+            </a:extLst>
+          </p:cNvPr>
+          <p:cNvSpPr/>
+          <p:nvPr/>
+        </p:nvSpPr>
+        <p:spPr>
+          <a:xfrm>
+            <a:off x="990599" y="3063645"/>
+            <a:ext cx="2052747" cy="816678"/>
+          </a:xfrm>
+          <a:prstGeom prst="roundRect">
+            <a:avLst/>
+          </a:prstGeom>
+        </p:spPr>
+        <p:style>
+          <a:lnRef idx="2">
+            <a:schemeClr val="accent1">
+              <a:shade val="15000"/>
+            </a:schemeClr>
+          </a:lnRef>
+          <a:fillRef idx="1">
+            <a:schemeClr val="accent1"/>
+          </a:fillRef>
+          <a:effectRef idx="0">
+            <a:schemeClr val="accent1"/>
+          </a:effectRef>
+          <a:fontRef idx="minor">
+            <a:schemeClr val="lt1"/>
+          </a:fontRef>
+        </p:style>
+        <p:txBody>
+          <a:bodyPr rtlCol="0" anchor="ctr"/>
+          <a:lstStyle/>
+          <a:p>
+            <a:pPr algn="ctr"/>
+            <a:r>
+              <a:rPr lang="en-US" dirty="0"/>
+              <a:t>Environment Creation</a:t>
+            </a:r>
+            <a:endParaRPr lang="it-IT" dirty="0"/>
+          </a:p>
+        </p:txBody>
+      </p:sp>
+      <p:sp>
+        <p:nvSpPr>
+          <p:cNvPr id="7" name="Rectangle: Rounded Corners 6">
+            <a:extLst>
+              <a:ext uri="{FF2B5EF4-FFF2-40B4-BE49-F238E27FC236}">
+                <a16:creationId xmlns:a16="http://schemas.microsoft.com/office/drawing/2014/main" id="{4881A444-3923-E77E-0AA3-4CE676819DDC}"/>
+              </a:ext>
+            </a:extLst>
+          </p:cNvPr>
+          <p:cNvSpPr/>
+          <p:nvPr/>
+        </p:nvSpPr>
+        <p:spPr>
+          <a:xfrm>
+            <a:off x="3760750" y="3063645"/>
+            <a:ext cx="2052747" cy="816678"/>
+          </a:xfrm>
+          <a:prstGeom prst="roundRect">
+            <a:avLst/>
+          </a:prstGeom>
+        </p:spPr>
+        <p:style>
+          <a:lnRef idx="2">
+            <a:schemeClr val="accent1">
+              <a:shade val="15000"/>
+            </a:schemeClr>
+          </a:lnRef>
+          <a:fillRef idx="1">
+            <a:schemeClr val="accent1"/>
+          </a:fillRef>
+          <a:effectRef idx="0">
+            <a:schemeClr val="accent1"/>
+          </a:effectRef>
+          <a:fontRef idx="minor">
+            <a:schemeClr val="lt1"/>
+          </a:fontRef>
+        </p:style>
+        <p:txBody>
+          <a:bodyPr rtlCol="0" anchor="ctr"/>
+          <a:lstStyle/>
+          <a:p>
+            <a:pPr algn="ctr"/>
+            <a:r>
+              <a:rPr lang="en-US" dirty="0"/>
+              <a:t>SKRL Model Implementation</a:t>
+            </a:r>
+            <a:endParaRPr lang="it-IT" dirty="0"/>
+          </a:p>
+        </p:txBody>
+      </p:sp>
+      <p:sp>
+        <p:nvSpPr>
+          <p:cNvPr id="8" name="Rectangle: Rounded Corners 7">
+            <a:extLst>
+              <a:ext uri="{FF2B5EF4-FFF2-40B4-BE49-F238E27FC236}">
+                <a16:creationId xmlns:a16="http://schemas.microsoft.com/office/drawing/2014/main" id="{8899F510-4D63-CBFA-26FA-BDC34268D867}"/>
+              </a:ext>
+            </a:extLst>
+          </p:cNvPr>
+          <p:cNvSpPr/>
+          <p:nvPr/>
+        </p:nvSpPr>
+        <p:spPr>
+          <a:xfrm>
+            <a:off x="6530901" y="3063645"/>
+            <a:ext cx="2052747" cy="816678"/>
+          </a:xfrm>
+          <a:prstGeom prst="roundRect">
+            <a:avLst/>
+          </a:prstGeom>
+        </p:spPr>
+        <p:style>
+          <a:lnRef idx="2">
+            <a:schemeClr val="accent1">
+              <a:shade val="15000"/>
+            </a:schemeClr>
+          </a:lnRef>
+          <a:fillRef idx="1">
+            <a:schemeClr val="accent1"/>
+          </a:fillRef>
+          <a:effectRef idx="0">
+            <a:schemeClr val="accent1"/>
+          </a:effectRef>
+          <a:fontRef idx="minor">
+            <a:schemeClr val="lt1"/>
+          </a:fontRef>
+        </p:style>
+        <p:txBody>
+          <a:bodyPr rtlCol="0" anchor="ctr"/>
+          <a:lstStyle/>
+          <a:p>
+            <a:pPr algn="ctr"/>
+            <a:r>
+              <a:rPr lang="en-US" dirty="0"/>
+              <a:t>Reward Function Definition</a:t>
+            </a:r>
+            <a:endParaRPr lang="it-IT" dirty="0"/>
+          </a:p>
+        </p:txBody>
+      </p:sp>
+      <p:sp>
+        <p:nvSpPr>
+          <p:cNvPr id="9" name="Rectangle: Rounded Corners 8">
+            <a:extLst>
+              <a:ext uri="{FF2B5EF4-FFF2-40B4-BE49-F238E27FC236}">
+                <a16:creationId xmlns:a16="http://schemas.microsoft.com/office/drawing/2014/main" id="{0E45E9D7-1531-C497-491A-D6450DEC9EEA}"/>
+              </a:ext>
+            </a:extLst>
+          </p:cNvPr>
+          <p:cNvSpPr/>
+          <p:nvPr/>
+        </p:nvSpPr>
+        <p:spPr>
+          <a:xfrm>
+            <a:off x="9301053" y="3063645"/>
+            <a:ext cx="2052747" cy="816678"/>
+          </a:xfrm>
+          <a:prstGeom prst="roundRect">
+            <a:avLst/>
+          </a:prstGeom>
+        </p:spPr>
+        <p:style>
+          <a:lnRef idx="2">
+            <a:schemeClr val="accent1">
+              <a:shade val="15000"/>
+            </a:schemeClr>
+          </a:lnRef>
+          <a:fillRef idx="1">
+            <a:schemeClr val="accent1"/>
+          </a:fillRef>
+          <a:effectRef idx="0">
+            <a:schemeClr val="accent1"/>
+          </a:effectRef>
+          <a:fontRef idx="minor">
+            <a:schemeClr val="lt1"/>
+          </a:fontRef>
+        </p:style>
+        <p:txBody>
+          <a:bodyPr rtlCol="0" anchor="ctr"/>
+          <a:lstStyle/>
+          <a:p>
+            <a:pPr algn="ctr"/>
+            <a:r>
+              <a:rPr lang="en-US" dirty="0"/>
+              <a:t>Task Simulation &amp; Training</a:t>
+            </a:r>
+            <a:endParaRPr lang="it-IT" dirty="0"/>
+          </a:p>
+        </p:txBody>
+      </p:sp>
+      <p:cxnSp>
+        <p:nvCxnSpPr>
+          <p:cNvPr id="11" name="Straight Arrow Connector 10">
+            <a:extLst>
+              <a:ext uri="{FF2B5EF4-FFF2-40B4-BE49-F238E27FC236}">
+                <a16:creationId xmlns:a16="http://schemas.microsoft.com/office/drawing/2014/main" id="{CE0E356E-EECA-8828-E3D5-F4254A80300C}"/>
+              </a:ext>
+            </a:extLst>
+          </p:cNvPr>
+          <p:cNvCxnSpPr>
+            <a:stCxn id="6" idx="3"/>
+            <a:endCxn id="7" idx="1"/>
+          </p:cNvCxnSpPr>
+          <p:nvPr/>
+        </p:nvCxnSpPr>
+        <p:spPr>
+          <a:xfrm>
+            <a:off x="3043346" y="3471984"/>
+            <a:ext cx="717404" cy="0"/>
+          </a:xfrm>
+          <a:prstGeom prst="straightConnector1">
+            <a:avLst/>
+          </a:prstGeom>
+          <a:ln>
+            <a:tailEnd type="triangle"/>
+          </a:ln>
+        </p:spPr>
+        <p:style>
+          <a:lnRef idx="2">
+            <a:schemeClr val="dk1"/>
+          </a:lnRef>
+          <a:fillRef idx="0">
+            <a:schemeClr val="dk1"/>
+          </a:fillRef>
+          <a:effectRef idx="1">
+            <a:schemeClr val="dk1"/>
+          </a:effectRef>
+          <a:fontRef idx="minor">
+            <a:schemeClr val="tx1"/>
+          </a:fontRef>
+        </p:style>
+      </p:cxnSp>
+      <p:cxnSp>
+        <p:nvCxnSpPr>
+          <p:cNvPr id="13" name="Straight Arrow Connector 12">
+            <a:extLst>
+              <a:ext uri="{FF2B5EF4-FFF2-40B4-BE49-F238E27FC236}">
+                <a16:creationId xmlns:a16="http://schemas.microsoft.com/office/drawing/2014/main" id="{0CAA1B13-DCA7-04BD-5E2B-D06102BA048E}"/>
+              </a:ext>
+            </a:extLst>
+          </p:cNvPr>
+          <p:cNvCxnSpPr>
+            <a:stCxn id="7" idx="3"/>
+            <a:endCxn id="8" idx="1"/>
+          </p:cNvCxnSpPr>
+          <p:nvPr/>
+        </p:nvCxnSpPr>
+        <p:spPr>
+          <a:xfrm>
+            <a:off x="5813497" y="3471984"/>
+            <a:ext cx="717404" cy="0"/>
+          </a:xfrm>
+          <a:prstGeom prst="straightConnector1">
+            <a:avLst/>
+          </a:prstGeom>
+          <a:ln>
+            <a:tailEnd type="triangle"/>
+          </a:ln>
+        </p:spPr>
+        <p:style>
+          <a:lnRef idx="2">
+            <a:schemeClr val="dk1"/>
+          </a:lnRef>
+          <a:fillRef idx="0">
+            <a:schemeClr val="dk1"/>
+          </a:fillRef>
+          <a:effectRef idx="1">
+            <a:schemeClr val="dk1"/>
+          </a:effectRef>
+          <a:fontRef idx="minor">
+            <a:schemeClr val="tx1"/>
+          </a:fontRef>
+        </p:style>
+      </p:cxnSp>
+      <p:cxnSp>
+        <p:nvCxnSpPr>
+          <p:cNvPr id="15" name="Straight Arrow Connector 14">
+            <a:extLst>
+              <a:ext uri="{FF2B5EF4-FFF2-40B4-BE49-F238E27FC236}">
+                <a16:creationId xmlns:a16="http://schemas.microsoft.com/office/drawing/2014/main" id="{44161E50-CF6E-A778-5B4F-A701F44B96E4}"/>
+              </a:ext>
+            </a:extLst>
+          </p:cNvPr>
+          <p:cNvCxnSpPr>
+            <a:stCxn id="8" idx="3"/>
+            <a:endCxn id="9" idx="1"/>
+          </p:cNvCxnSpPr>
+          <p:nvPr/>
+        </p:nvCxnSpPr>
+        <p:spPr>
+          <a:xfrm>
+            <a:off x="8583648" y="3471984"/>
+            <a:ext cx="717405" cy="0"/>
+          </a:xfrm>
+          <a:prstGeom prst="straightConnector1">
+            <a:avLst/>
+          </a:prstGeom>
+          <a:ln>
+            <a:tailEnd type="triangle"/>
+          </a:ln>
+        </p:spPr>
+        <p:style>
+          <a:lnRef idx="2">
+            <a:schemeClr val="dk1"/>
+          </a:lnRef>
+          <a:fillRef idx="0">
+            <a:schemeClr val="dk1"/>
+          </a:fillRef>
+          <a:effectRef idx="1">
+            <a:schemeClr val="dk1"/>
+          </a:effectRef>
+          <a:fontRef idx="minor">
+            <a:schemeClr val="tx1"/>
+          </a:fontRef>
+        </p:style>
+      </p:cxnSp>
+      <p:sp>
+        <p:nvSpPr>
+          <p:cNvPr id="16" name="Oval 15">
+            <a:extLst>
+              <a:ext uri="{FF2B5EF4-FFF2-40B4-BE49-F238E27FC236}">
+                <a16:creationId xmlns:a16="http://schemas.microsoft.com/office/drawing/2014/main" id="{5904CD7A-C1B7-CD1A-01BA-A2EE9627F53B}"/>
+              </a:ext>
+            </a:extLst>
+          </p:cNvPr>
+          <p:cNvSpPr/>
+          <p:nvPr/>
+        </p:nvSpPr>
+        <p:spPr>
+          <a:xfrm>
+            <a:off x="802720" y="2889785"/>
+            <a:ext cx="355988" cy="355988"/>
+          </a:xfrm>
+          <a:prstGeom prst="ellipse">
+            <a:avLst/>
+          </a:prstGeom>
+        </p:spPr>
+        <p:style>
+          <a:lnRef idx="2">
+            <a:schemeClr val="dk1">
+              <a:shade val="15000"/>
+            </a:schemeClr>
+          </a:lnRef>
+          <a:fillRef idx="1">
+            <a:schemeClr val="dk1"/>
+          </a:fillRef>
+          <a:effectRef idx="0">
+            <a:schemeClr val="dk1"/>
+          </a:effectRef>
+          <a:fontRef idx="minor">
+            <a:schemeClr val="lt1"/>
+          </a:fontRef>
+        </p:style>
+        <p:txBody>
+          <a:bodyPr rtlCol="0" anchor="ctr"/>
+          <a:lstStyle/>
+          <a:p>
+            <a:pPr algn="ctr"/>
+            <a:r>
+              <a:rPr lang="en-US" dirty="0"/>
+              <a:t>1</a:t>
+            </a:r>
+            <a:endParaRPr lang="it-IT" dirty="0"/>
+          </a:p>
+        </p:txBody>
+      </p:sp>
+      <p:sp>
+        <p:nvSpPr>
+          <p:cNvPr id="17" name="Oval 16">
+            <a:extLst>
+              <a:ext uri="{FF2B5EF4-FFF2-40B4-BE49-F238E27FC236}">
+                <a16:creationId xmlns:a16="http://schemas.microsoft.com/office/drawing/2014/main" id="{13D5E6D5-41BD-21CF-0D34-4E893C476D30}"/>
+              </a:ext>
+            </a:extLst>
+          </p:cNvPr>
+          <p:cNvSpPr/>
+          <p:nvPr/>
+        </p:nvSpPr>
+        <p:spPr>
+          <a:xfrm>
+            <a:off x="3582756" y="2889785"/>
+            <a:ext cx="355988" cy="355988"/>
+          </a:xfrm>
+          <a:prstGeom prst="ellipse">
+            <a:avLst/>
+          </a:prstGeom>
+        </p:spPr>
+        <p:style>
+          <a:lnRef idx="2">
+            <a:schemeClr val="dk1">
+              <a:shade val="15000"/>
+            </a:schemeClr>
+          </a:lnRef>
+          <a:fillRef idx="1">
+            <a:schemeClr val="dk1"/>
+          </a:fillRef>
+          <a:effectRef idx="0">
+            <a:schemeClr val="dk1"/>
+          </a:effectRef>
+          <a:fontRef idx="minor">
+            <a:schemeClr val="lt1"/>
+          </a:fontRef>
+        </p:style>
+        <p:txBody>
+          <a:bodyPr rtlCol="0" anchor="ctr"/>
+          <a:lstStyle/>
+          <a:p>
+            <a:pPr algn="ctr"/>
+            <a:r>
+              <a:rPr lang="en-US" dirty="0"/>
+              <a:t>2</a:t>
+            </a:r>
+            <a:endParaRPr lang="it-IT" dirty="0"/>
+          </a:p>
+        </p:txBody>
+      </p:sp>
+      <p:sp>
+        <p:nvSpPr>
+          <p:cNvPr id="18" name="Oval 17">
+            <a:extLst>
+              <a:ext uri="{FF2B5EF4-FFF2-40B4-BE49-F238E27FC236}">
+                <a16:creationId xmlns:a16="http://schemas.microsoft.com/office/drawing/2014/main" id="{993588C1-FFEA-AFD7-C9C4-1A162102A284}"/>
+              </a:ext>
+            </a:extLst>
+          </p:cNvPr>
+          <p:cNvSpPr/>
+          <p:nvPr/>
+        </p:nvSpPr>
+        <p:spPr>
+          <a:xfrm>
+            <a:off x="6352907" y="2885651"/>
+            <a:ext cx="355988" cy="355988"/>
+          </a:xfrm>
+          <a:prstGeom prst="ellipse">
+            <a:avLst/>
+          </a:prstGeom>
+        </p:spPr>
+        <p:style>
+          <a:lnRef idx="2">
+            <a:schemeClr val="dk1">
+              <a:shade val="15000"/>
+            </a:schemeClr>
+          </a:lnRef>
+          <a:fillRef idx="1">
+            <a:schemeClr val="dk1"/>
+          </a:fillRef>
+          <a:effectRef idx="0">
+            <a:schemeClr val="dk1"/>
+          </a:effectRef>
+          <a:fontRef idx="minor">
+            <a:schemeClr val="lt1"/>
+          </a:fontRef>
+        </p:style>
+        <p:txBody>
+          <a:bodyPr rtlCol="0" anchor="ctr"/>
+          <a:lstStyle/>
+          <a:p>
+            <a:pPr algn="ctr"/>
+            <a:r>
+              <a:rPr lang="en-US" dirty="0"/>
+              <a:t>3</a:t>
+            </a:r>
+            <a:endParaRPr lang="it-IT" dirty="0"/>
+          </a:p>
+        </p:txBody>
+      </p:sp>
+      <p:sp>
+        <p:nvSpPr>
+          <p:cNvPr id="19" name="Oval 18">
+            <a:extLst>
+              <a:ext uri="{FF2B5EF4-FFF2-40B4-BE49-F238E27FC236}">
+                <a16:creationId xmlns:a16="http://schemas.microsoft.com/office/drawing/2014/main" id="{33C583D5-F73D-A756-8144-3ED7E01C0BF4}"/>
+              </a:ext>
+            </a:extLst>
+          </p:cNvPr>
+          <p:cNvSpPr/>
+          <p:nvPr/>
+        </p:nvSpPr>
+        <p:spPr>
+          <a:xfrm>
+            <a:off x="9123058" y="2885651"/>
+            <a:ext cx="355988" cy="355988"/>
+          </a:xfrm>
+          <a:prstGeom prst="ellipse">
+            <a:avLst/>
+          </a:prstGeom>
+        </p:spPr>
+        <p:style>
+          <a:lnRef idx="2">
+            <a:schemeClr val="dk1">
+              <a:shade val="15000"/>
+            </a:schemeClr>
+          </a:lnRef>
+          <a:fillRef idx="1">
+            <a:schemeClr val="dk1"/>
+          </a:fillRef>
+          <a:effectRef idx="0">
+            <a:schemeClr val="dk1"/>
+          </a:effectRef>
+          <a:fontRef idx="minor">
+            <a:schemeClr val="lt1"/>
+          </a:fontRef>
+        </p:style>
+        <p:txBody>
+          <a:bodyPr rtlCol="0" anchor="ctr"/>
+          <a:lstStyle/>
+          <a:p>
+            <a:pPr algn="ctr"/>
+            <a:r>
+              <a:rPr lang="en-US" dirty="0"/>
+              <a:t>4</a:t>
+            </a:r>
+            <a:endParaRPr lang="it-IT" dirty="0"/>
+          </a:p>
+        </p:txBody>
+      </p:sp>
+      <p:sp>
+        <p:nvSpPr>
+          <p:cNvPr id="20" name="TextBox 19">
+            <a:extLst>
+              <a:ext uri="{FF2B5EF4-FFF2-40B4-BE49-F238E27FC236}">
+                <a16:creationId xmlns:a16="http://schemas.microsoft.com/office/drawing/2014/main" id="{B92F0D7C-947B-CDC5-3B94-2EB37F3AC334}"/>
+              </a:ext>
+            </a:extLst>
+          </p:cNvPr>
+          <p:cNvSpPr txBox="1"/>
+          <p:nvPr/>
+        </p:nvSpPr>
+        <p:spPr>
+          <a:xfrm>
+            <a:off x="1093059" y="4697001"/>
+            <a:ext cx="1840535" cy="738664"/>
+          </a:xfrm>
+          <a:prstGeom prst="rect">
+            <a:avLst/>
+          </a:prstGeom>
+          <a:noFill/>
+        </p:spPr>
+        <p:txBody>
+          <a:bodyPr wrap="square" rtlCol="0">
+            <a:spAutoFit/>
+          </a:bodyPr>
+          <a:lstStyle/>
+          <a:p>
+            <a:pPr algn="ctr"/>
+            <a:r>
+              <a:rPr lang="en-US" sz="1400" dirty="0"/>
+              <a:t>INSERIRE IMMAGINE</a:t>
+            </a:r>
+          </a:p>
+          <a:p>
+            <a:pPr algn="ctr"/>
+            <a:r>
+              <a:rPr lang="en-US" sz="1400" dirty="0"/>
+              <a:t>AMBIENTE SIMULATO</a:t>
+            </a:r>
+            <a:br>
+              <a:rPr lang="en-US" sz="1400" dirty="0"/>
+            </a:br>
+            <a:r>
+              <a:rPr lang="en-US" sz="1400" dirty="0"/>
+              <a:t>CON DRONE E PALLA</a:t>
+            </a:r>
+            <a:endParaRPr lang="it-IT" sz="1400" dirty="0"/>
+          </a:p>
+        </p:txBody>
+      </p:sp>
+      <p:sp>
+        <p:nvSpPr>
+          <p:cNvPr id="22" name="TextBox 21">
+            <a:extLst>
+              <a:ext uri="{FF2B5EF4-FFF2-40B4-BE49-F238E27FC236}">
+                <a16:creationId xmlns:a16="http://schemas.microsoft.com/office/drawing/2014/main" id="{C99AD569-4D4F-02CB-455F-B921108DA333}"/>
+              </a:ext>
+            </a:extLst>
+          </p:cNvPr>
+          <p:cNvSpPr txBox="1"/>
+          <p:nvPr/>
+        </p:nvSpPr>
+        <p:spPr>
+          <a:xfrm>
+            <a:off x="3857090" y="4635053"/>
+            <a:ext cx="1860067" cy="1323439"/>
+          </a:xfrm>
+          <a:prstGeom prst="rect">
+            <a:avLst/>
+          </a:prstGeom>
+          <a:noFill/>
+        </p:spPr>
+        <p:txBody>
+          <a:bodyPr wrap="square" rtlCol="0">
+            <a:spAutoFit/>
+          </a:bodyPr>
+          <a:lstStyle/>
+          <a:p>
+            <a:pPr marL="174625" indent="-174625">
+              <a:buFont typeface="Arial" panose="020B0604020202020204" pitchFamily="34" charset="0"/>
+              <a:buChar char="•"/>
+            </a:pPr>
+            <a:r>
+              <a:rPr lang="en-US" sz="1600" dirty="0"/>
+              <a:t>Observations</a:t>
+            </a:r>
+          </a:p>
+          <a:p>
+            <a:pPr marL="174625" indent="-174625">
+              <a:buFont typeface="Arial" panose="020B0604020202020204" pitchFamily="34" charset="0"/>
+              <a:buChar char="•"/>
+            </a:pPr>
+            <a:r>
+              <a:rPr lang="en-US" sz="1600" dirty="0"/>
+              <a:t>Actions</a:t>
+            </a:r>
+          </a:p>
+          <a:p>
+            <a:pPr marL="174625" indent="-174625">
+              <a:buFont typeface="Arial" panose="020B0604020202020204" pitchFamily="34" charset="0"/>
+              <a:buChar char="•"/>
+            </a:pPr>
+            <a:r>
+              <a:rPr lang="en-US" sz="1600" dirty="0"/>
+              <a:t>Actor model</a:t>
+            </a:r>
+          </a:p>
+          <a:p>
+            <a:pPr marL="174625" indent="-174625">
+              <a:buFont typeface="Arial" panose="020B0604020202020204" pitchFamily="34" charset="0"/>
+              <a:buChar char="•"/>
+            </a:pPr>
+            <a:r>
+              <a:rPr lang="en-US" sz="1600" dirty="0"/>
+              <a:t>Critic model</a:t>
+            </a:r>
+          </a:p>
+          <a:p>
+            <a:pPr marL="174625" indent="-174625">
+              <a:buFont typeface="Arial" panose="020B0604020202020204" pitchFamily="34" charset="0"/>
+              <a:buChar char="•"/>
+            </a:pPr>
+            <a:r>
+              <a:rPr lang="en-US" sz="1600" dirty="0"/>
+              <a:t>Main parameters</a:t>
+            </a:r>
+            <a:endParaRPr lang="it-IT" sz="1600" dirty="0"/>
+          </a:p>
+        </p:txBody>
+      </p:sp>
+      <p:cxnSp>
+        <p:nvCxnSpPr>
+          <p:cNvPr id="25" name="Straight Arrow Connector 24">
+            <a:extLst>
+              <a:ext uri="{FF2B5EF4-FFF2-40B4-BE49-F238E27FC236}">
+                <a16:creationId xmlns:a16="http://schemas.microsoft.com/office/drawing/2014/main" id="{79B0E0D9-EE53-895B-3742-0C5761520A4F}"/>
+              </a:ext>
+            </a:extLst>
+          </p:cNvPr>
+          <p:cNvCxnSpPr>
+            <a:cxnSpLocks/>
+            <a:stCxn id="7" idx="2"/>
+            <a:endCxn id="23" idx="0"/>
+          </p:cNvCxnSpPr>
+          <p:nvPr/>
+        </p:nvCxnSpPr>
+        <p:spPr>
+          <a:xfrm>
+            <a:off x="4787124" y="3880323"/>
+            <a:ext cx="0" cy="653507"/>
+          </a:xfrm>
+          <a:prstGeom prst="straightConnector1">
+            <a:avLst/>
+          </a:prstGeom>
+          <a:ln>
+            <a:tailEnd type="triangle"/>
+          </a:ln>
+        </p:spPr>
+        <p:style>
+          <a:lnRef idx="2">
+            <a:schemeClr val="accent1"/>
+          </a:lnRef>
+          <a:fillRef idx="0">
+            <a:schemeClr val="accent1"/>
+          </a:fillRef>
+          <a:effectRef idx="1">
+            <a:schemeClr val="accent1"/>
+          </a:effectRef>
+          <a:fontRef idx="minor">
+            <a:schemeClr val="tx1"/>
+          </a:fontRef>
+        </p:style>
+      </p:cxnSp>
+      <p:pic>
+        <p:nvPicPr>
+          <p:cNvPr id="26" name="Immagine 15" descr="Immagine che contiene clipart, halloween, Elementi grafici, zucca&#10;&#10;Descrizione generata automaticamente">
+            <a:extLst>
+              <a:ext uri="{FF2B5EF4-FFF2-40B4-BE49-F238E27FC236}">
+                <a16:creationId xmlns:a16="http://schemas.microsoft.com/office/drawing/2014/main" id="{B49413F5-C76F-0303-E527-0D5366C86D0C}"/>
+              </a:ext>
+            </a:extLst>
+          </p:cNvPr>
+          <p:cNvPicPr>
+            <a:picLocks noChangeAspect="1"/>
+          </p:cNvPicPr>
+          <p:nvPr/>
+        </p:nvPicPr>
+        <p:blipFill>
+          <a:blip r:embed="rId3">
+            <a:extLst>
+              <a:ext uri="{28A0092B-C50C-407E-A947-70E740481C1C}">
+                <a14:useLocalDpi xmlns:a14="http://schemas.microsoft.com/office/drawing/2010/main" val="0"/>
+              </a:ext>
+            </a:extLst>
+          </a:blip>
+          <a:stretch>
+            <a:fillRect/>
+          </a:stretch>
+        </p:blipFill>
+        <p:spPr>
+          <a:xfrm>
+            <a:off x="4299174" y="5958492"/>
+            <a:ext cx="975898" cy="513973"/>
+          </a:xfrm>
+          <a:prstGeom prst="rect">
+            <a:avLst/>
+          </a:prstGeom>
+        </p:spPr>
+      </p:pic>
+      <p:cxnSp>
+        <p:nvCxnSpPr>
+          <p:cNvPr id="30" name="Straight Arrow Connector 29">
+            <a:extLst>
+              <a:ext uri="{FF2B5EF4-FFF2-40B4-BE49-F238E27FC236}">
+                <a16:creationId xmlns:a16="http://schemas.microsoft.com/office/drawing/2014/main" id="{221E4D3D-1112-EB89-F6D0-EA6CF7064BE0}"/>
+              </a:ext>
+            </a:extLst>
+          </p:cNvPr>
+          <p:cNvCxnSpPr>
+            <a:cxnSpLocks/>
+          </p:cNvCxnSpPr>
+          <p:nvPr/>
+        </p:nvCxnSpPr>
+        <p:spPr>
+          <a:xfrm>
+            <a:off x="1985309" y="3880323"/>
+            <a:ext cx="0" cy="653507"/>
+          </a:xfrm>
+          <a:prstGeom prst="straightConnector1">
+            <a:avLst/>
+          </a:prstGeom>
+          <a:ln>
+            <a:tailEnd type="triangle"/>
+          </a:ln>
+        </p:spPr>
+        <p:style>
+          <a:lnRef idx="2">
+            <a:schemeClr val="accent1"/>
+          </a:lnRef>
+          <a:fillRef idx="0">
+            <a:schemeClr val="accent1"/>
+          </a:fillRef>
+          <a:effectRef idx="1">
+            <a:schemeClr val="accent1"/>
+          </a:effectRef>
+          <a:fontRef idx="minor">
+            <a:schemeClr val="tx1"/>
+          </a:fontRef>
+        </p:style>
+      </p:cxnSp>
+      <p:sp>
+        <p:nvSpPr>
+          <p:cNvPr id="31" name="Rectangle: Rounded Corners 30">
+            <a:extLst>
+              <a:ext uri="{FF2B5EF4-FFF2-40B4-BE49-F238E27FC236}">
+                <a16:creationId xmlns:a16="http://schemas.microsoft.com/office/drawing/2014/main" id="{72472EED-5236-23A7-CBF9-643EE0FBC5BA}"/>
+              </a:ext>
+            </a:extLst>
+          </p:cNvPr>
+          <p:cNvSpPr/>
+          <p:nvPr/>
+        </p:nvSpPr>
+        <p:spPr>
+          <a:xfrm>
+            <a:off x="6530900" y="4524563"/>
+            <a:ext cx="2052747" cy="1898481"/>
+          </a:xfrm>
+          <a:prstGeom prst="roundRect">
+            <a:avLst>
+              <a:gd name="adj" fmla="val 8957"/>
+            </a:avLst>
+          </a:prstGeom>
+        </p:spPr>
+        <p:style>
+          <a:lnRef idx="2">
+            <a:schemeClr val="accent1"/>
+          </a:lnRef>
+          <a:fillRef idx="1">
+            <a:schemeClr val="lt1"/>
+          </a:fillRef>
+          <a:effectRef idx="0">
+            <a:schemeClr val="accent1"/>
+          </a:effectRef>
+          <a:fontRef idx="minor">
+            <a:schemeClr val="dk1"/>
+          </a:fontRef>
+        </p:style>
+        <p:txBody>
+          <a:bodyPr rtlCol="0" anchor="ctr"/>
+          <a:lstStyle/>
+          <a:p>
+            <a:pPr algn="ctr"/>
+            <a:endParaRPr lang="it-IT"/>
+          </a:p>
+        </p:txBody>
+      </p:sp>
+      <p:sp>
+        <p:nvSpPr>
+          <p:cNvPr id="32" name="TextBox 31">
+            <a:extLst>
+              <a:ext uri="{FF2B5EF4-FFF2-40B4-BE49-F238E27FC236}">
+                <a16:creationId xmlns:a16="http://schemas.microsoft.com/office/drawing/2014/main" id="{47452609-2C35-856F-45B0-539434CCC92C}"/>
+              </a:ext>
+            </a:extLst>
+          </p:cNvPr>
+          <p:cNvSpPr txBox="1"/>
+          <p:nvPr/>
+        </p:nvSpPr>
+        <p:spPr>
+          <a:xfrm>
+            <a:off x="6627241" y="4635053"/>
+            <a:ext cx="1860067" cy="1077218"/>
+          </a:xfrm>
+          <a:prstGeom prst="rect">
+            <a:avLst/>
+          </a:prstGeom>
+          <a:noFill/>
+        </p:spPr>
+        <p:txBody>
+          <a:bodyPr wrap="square" rtlCol="0">
+            <a:spAutoFit/>
+          </a:bodyPr>
+          <a:lstStyle/>
+          <a:p>
+            <a:pPr marL="174625" indent="-174625">
+              <a:buFont typeface="Arial" panose="020B0604020202020204" pitchFamily="34" charset="0"/>
+              <a:buChar char="•"/>
+            </a:pPr>
+            <a:r>
+              <a:rPr lang="en-US" sz="1600" dirty="0"/>
+              <a:t>Inputs</a:t>
+            </a:r>
+          </a:p>
+          <a:p>
+            <a:pPr marL="174625" indent="-174625">
+              <a:buFont typeface="Arial" panose="020B0604020202020204" pitchFamily="34" charset="0"/>
+              <a:buChar char="•"/>
+            </a:pPr>
+            <a:r>
+              <a:rPr lang="en-US" sz="1600" dirty="0"/>
+              <a:t>Outputs</a:t>
+            </a:r>
+          </a:p>
+          <a:p>
+            <a:pPr marL="174625" indent="-174625">
+              <a:buFont typeface="Arial" panose="020B0604020202020204" pitchFamily="34" charset="0"/>
+              <a:buChar char="•"/>
+            </a:pPr>
+            <a:r>
+              <a:rPr lang="en-US" sz="1600" dirty="0"/>
+              <a:t>Components</a:t>
+            </a:r>
+          </a:p>
+          <a:p>
+            <a:pPr marL="174625" indent="-174625">
+              <a:buFont typeface="Arial" panose="020B0604020202020204" pitchFamily="34" charset="0"/>
+              <a:buChar char="•"/>
+            </a:pPr>
+            <a:r>
+              <a:rPr lang="en-US" sz="1600" dirty="0"/>
+              <a:t>Reset array</a:t>
+            </a:r>
+          </a:p>
+        </p:txBody>
+      </p:sp>
+      <p:sp>
+        <p:nvSpPr>
+          <p:cNvPr id="34" name="Rectangle: Rounded Corners 33">
+            <a:extLst>
+              <a:ext uri="{FF2B5EF4-FFF2-40B4-BE49-F238E27FC236}">
+                <a16:creationId xmlns:a16="http://schemas.microsoft.com/office/drawing/2014/main" id="{DBD8933F-865E-87A4-AC0B-F316B6C13F41}"/>
+              </a:ext>
+            </a:extLst>
+          </p:cNvPr>
+          <p:cNvSpPr/>
+          <p:nvPr/>
+        </p:nvSpPr>
+        <p:spPr>
+          <a:xfrm>
+            <a:off x="9308344" y="4533830"/>
+            <a:ext cx="2052747" cy="1424662"/>
+          </a:xfrm>
+          <a:prstGeom prst="roundRect">
+            <a:avLst>
+              <a:gd name="adj" fmla="val 8957"/>
+            </a:avLst>
+          </a:prstGeom>
+        </p:spPr>
+        <p:style>
+          <a:lnRef idx="2">
+            <a:schemeClr val="accent1"/>
+          </a:lnRef>
+          <a:fillRef idx="1">
+            <a:schemeClr val="lt1"/>
+          </a:fillRef>
+          <a:effectRef idx="0">
+            <a:schemeClr val="accent1"/>
+          </a:effectRef>
+          <a:fontRef idx="minor">
+            <a:schemeClr val="dk1"/>
+          </a:fontRef>
+        </p:style>
+        <p:txBody>
+          <a:bodyPr rtlCol="0" anchor="ctr"/>
+          <a:lstStyle/>
+          <a:p>
+            <a:pPr algn="ctr"/>
+            <a:endParaRPr lang="it-IT"/>
+          </a:p>
+        </p:txBody>
+      </p:sp>
+      <p:sp>
+        <p:nvSpPr>
+          <p:cNvPr id="35" name="TextBox 34">
+            <a:extLst>
+              <a:ext uri="{FF2B5EF4-FFF2-40B4-BE49-F238E27FC236}">
+                <a16:creationId xmlns:a16="http://schemas.microsoft.com/office/drawing/2014/main" id="{AB11681D-FBC1-3E5D-C82C-68973C78FF88}"/>
+              </a:ext>
+            </a:extLst>
+          </p:cNvPr>
+          <p:cNvSpPr txBox="1"/>
+          <p:nvPr/>
+        </p:nvSpPr>
+        <p:spPr>
+          <a:xfrm>
+            <a:off x="9404684" y="4635053"/>
+            <a:ext cx="1860067" cy="830997"/>
+          </a:xfrm>
+          <a:prstGeom prst="rect">
+            <a:avLst/>
+          </a:prstGeom>
+          <a:noFill/>
+        </p:spPr>
+        <p:txBody>
+          <a:bodyPr wrap="square" rtlCol="0">
+            <a:spAutoFit/>
+          </a:bodyPr>
+          <a:lstStyle/>
+          <a:p>
+            <a:pPr marL="174625" indent="-174625">
+              <a:buFont typeface="Arial" panose="020B0604020202020204" pitchFamily="34" charset="0"/>
+              <a:buChar char="•"/>
+            </a:pPr>
+            <a:r>
+              <a:rPr lang="en-US" sz="1600" dirty="0"/>
+              <a:t>Physics</a:t>
+            </a:r>
+          </a:p>
+          <a:p>
+            <a:pPr marL="174625" indent="-174625">
+              <a:buFont typeface="Arial" panose="020B0604020202020204" pitchFamily="34" charset="0"/>
+              <a:buChar char="•"/>
+            </a:pPr>
+            <a:r>
+              <a:rPr lang="en-US" sz="1600" dirty="0"/>
+              <a:t>Logging</a:t>
+            </a:r>
+          </a:p>
+          <a:p>
+            <a:pPr marL="174625" indent="-174625">
+              <a:buFont typeface="Arial" panose="020B0604020202020204" pitchFamily="34" charset="0"/>
+              <a:buChar char="•"/>
+            </a:pPr>
+            <a:r>
+              <a:rPr lang="en-US" sz="1600" dirty="0"/>
+              <a:t>Data collection</a:t>
+            </a:r>
+            <a:endParaRPr lang="it-IT" sz="1600" dirty="0"/>
+          </a:p>
+        </p:txBody>
+      </p:sp>
+      <p:cxnSp>
+        <p:nvCxnSpPr>
+          <p:cNvPr id="39" name="Straight Arrow Connector 38">
+            <a:extLst>
+              <a:ext uri="{FF2B5EF4-FFF2-40B4-BE49-F238E27FC236}">
+                <a16:creationId xmlns:a16="http://schemas.microsoft.com/office/drawing/2014/main" id="{2064F1FD-FAA4-3BE7-028A-D128CEAD9D82}"/>
+              </a:ext>
+            </a:extLst>
+          </p:cNvPr>
+          <p:cNvCxnSpPr>
+            <a:cxnSpLocks/>
+            <a:stCxn id="8" idx="2"/>
+            <a:endCxn id="31" idx="0"/>
+          </p:cNvCxnSpPr>
+          <p:nvPr/>
+        </p:nvCxnSpPr>
+        <p:spPr>
+          <a:xfrm flipH="1">
+            <a:off x="7557274" y="3880323"/>
+            <a:ext cx="1" cy="644240"/>
+          </a:xfrm>
+          <a:prstGeom prst="straightConnector1">
+            <a:avLst/>
+          </a:prstGeom>
+          <a:ln>
+            <a:tailEnd type="triangle"/>
+          </a:ln>
+        </p:spPr>
+        <p:style>
+          <a:lnRef idx="2">
+            <a:schemeClr val="accent1"/>
+          </a:lnRef>
+          <a:fillRef idx="0">
+            <a:schemeClr val="accent1"/>
+          </a:fillRef>
+          <a:effectRef idx="1">
+            <a:schemeClr val="accent1"/>
+          </a:effectRef>
+          <a:fontRef idx="minor">
+            <a:schemeClr val="tx1"/>
+          </a:fontRef>
+        </p:style>
+      </p:cxnSp>
+      <p:cxnSp>
+        <p:nvCxnSpPr>
+          <p:cNvPr id="42" name="Straight Arrow Connector 41">
+            <a:extLst>
+              <a:ext uri="{FF2B5EF4-FFF2-40B4-BE49-F238E27FC236}">
+                <a16:creationId xmlns:a16="http://schemas.microsoft.com/office/drawing/2014/main" id="{DD9C5716-206E-DF0D-071E-1D1D1B92047E}"/>
+              </a:ext>
+            </a:extLst>
+          </p:cNvPr>
+          <p:cNvCxnSpPr>
+            <a:cxnSpLocks/>
+            <a:stCxn id="9" idx="2"/>
+            <a:endCxn id="34" idx="0"/>
+          </p:cNvCxnSpPr>
+          <p:nvPr/>
+        </p:nvCxnSpPr>
+        <p:spPr>
+          <a:xfrm>
+            <a:off x="10327427" y="3880323"/>
+            <a:ext cx="7291" cy="653507"/>
+          </a:xfrm>
+          <a:prstGeom prst="straightConnector1">
+            <a:avLst/>
+          </a:prstGeom>
+          <a:ln>
+            <a:tailEnd type="triangle"/>
+          </a:ln>
+        </p:spPr>
+        <p:style>
+          <a:lnRef idx="2">
+            <a:schemeClr val="accent1"/>
+          </a:lnRef>
+          <a:fillRef idx="0">
+            <a:schemeClr val="accent1"/>
+          </a:fillRef>
+          <a:effectRef idx="1">
+            <a:schemeClr val="accent1"/>
+          </a:effectRef>
+          <a:fontRef idx="minor">
+            <a:schemeClr val="tx1"/>
+          </a:fontRef>
+        </p:style>
+      </p:cxnSp>
+      <p:pic>
+        <p:nvPicPr>
+          <p:cNvPr id="44" name="Picture 43" descr="A black and white text&#10;&#10;Description automatically generated">
+            <a:extLst>
+              <a:ext uri="{FF2B5EF4-FFF2-40B4-BE49-F238E27FC236}">
+                <a16:creationId xmlns:a16="http://schemas.microsoft.com/office/drawing/2014/main" id="{4D432C0C-A6B7-7E97-57F6-FA63A009CF88}"/>
+              </a:ext>
+            </a:extLst>
+          </p:cNvPr>
+          <p:cNvPicPr>
+            <a:picLocks noChangeAspect="1"/>
+          </p:cNvPicPr>
+          <p:nvPr/>
+        </p:nvPicPr>
+        <p:blipFill>
+          <a:blip r:embed="rId4">
+            <a:extLst>
+              <a:ext uri="{28A0092B-C50C-407E-A947-70E740481C1C}">
+                <a14:useLocalDpi xmlns:a14="http://schemas.microsoft.com/office/drawing/2010/main" val="0"/>
+              </a:ext>
+            </a:extLst>
+          </a:blip>
+          <a:stretch>
+            <a:fillRect/>
+          </a:stretch>
+        </p:blipFill>
+        <p:spPr>
+          <a:xfrm>
+            <a:off x="9327516" y="5383001"/>
+            <a:ext cx="2014401" cy="560976"/>
+          </a:xfrm>
+          <a:prstGeom prst="rect">
+            <a:avLst/>
+          </a:prstGeom>
+        </p:spPr>
+      </p:pic>
+      <p:pic>
+        <p:nvPicPr>
+          <p:cNvPr id="46" name="Picture 45" descr="A blue and yellow snake logo&#10;&#10;Description automatically generated">
+            <a:extLst>
+              <a:ext uri="{FF2B5EF4-FFF2-40B4-BE49-F238E27FC236}">
+                <a16:creationId xmlns:a16="http://schemas.microsoft.com/office/drawing/2014/main" id="{0B3B3288-7E7F-9026-15FF-69F731F002AC}"/>
+              </a:ext>
+            </a:extLst>
+          </p:cNvPr>
+          <p:cNvPicPr>
+            <a:picLocks noChangeAspect="1"/>
+          </p:cNvPicPr>
+          <p:nvPr/>
+        </p:nvPicPr>
+        <p:blipFill>
+          <a:blip r:embed="rId5">
+            <a:extLst>
+              <a:ext uri="{28A0092B-C50C-407E-A947-70E740481C1C}">
+                <a14:useLocalDpi xmlns:a14="http://schemas.microsoft.com/office/drawing/2010/main" val="0"/>
+              </a:ext>
+            </a:extLst>
+          </a:blip>
+          <a:stretch>
+            <a:fillRect/>
+          </a:stretch>
+        </p:blipFill>
+        <p:spPr>
+          <a:xfrm>
+            <a:off x="7318630" y="5755298"/>
+            <a:ext cx="477284" cy="578419"/>
+          </a:xfrm>
+          <a:prstGeom prst="rect">
+            <a:avLst/>
+          </a:prstGeom>
+        </p:spPr>
+      </p:pic>
+    </p:spTree>
+    <p:extLst>
+      <p:ext uri="{BB962C8B-B14F-4D97-AF65-F5344CB8AC3E}">
+        <p14:creationId xmlns:p14="http://schemas.microsoft.com/office/powerpoint/2010/main" val="2480583241"/>
+      </p:ext>
+    </p:extLst>
+  </p:cSld>
+  <p:clrMapOvr>
+    <a:masterClrMapping/>
+  </p:clrMapOvr>
+</p:sld>
+</file>
+
+<file path=ppt/slides/slide8.xml><?xml version="1.0" encoding="utf-8"?>
+<p:sld xmlns:a="http://schemas.openxmlformats.org/drawingml/2006/main" xmlns:r="http://schemas.openxmlformats.org/officeDocument/2006/relationships" xmlns:p="http://schemas.openxmlformats.org/presentationml/2006/main">
+  <p:cSld>
+    <p:spTree>
+      <p:nvGrpSpPr>
+        <p:cNvPr id="1" name=""/>
+        <p:cNvGrpSpPr/>
+        <p:nvPr/>
+      </p:nvGrpSpPr>
+      <p:grpSpPr>
+        <a:xfrm>
+          <a:off x="0" y="0"/>
+          <a:ext cx="0" cy="0"/>
+          <a:chOff x="0" y="0"/>
+          <a:chExt cx="0" cy="0"/>
+        </a:xfrm>
+      </p:grpSpPr>
+      <p:sp>
+        <p:nvSpPr>
+          <p:cNvPr id="2" name="Titolo 1">
+            <a:extLst>
+              <a:ext uri="{FF2B5EF4-FFF2-40B4-BE49-F238E27FC236}">
+                <a16:creationId xmlns:a16="http://schemas.microsoft.com/office/drawing/2014/main" id="{D5F58EEC-3A74-ACCB-9A51-3B63C7A951AF}"/>
+              </a:ext>
+            </a:extLst>
+          </p:cNvPr>
+          <p:cNvSpPr>
+            <a:spLocks noGrp="1"/>
+          </p:cNvSpPr>
+          <p:nvPr>
+            <p:ph type="title"/>
+          </p:nvPr>
+        </p:nvSpPr>
+        <p:spPr/>
+        <p:txBody>
+          <a:bodyPr>
+            <a:normAutofit/>
+          </a:bodyPr>
+          <a:lstStyle/>
+          <a:p>
+            <a:r>
+              <a:rPr lang="en-US" dirty="0">
+                <a:latin typeface="Aptos SemiBold" panose="020B0004020202020204" pitchFamily="34" charset="0"/>
+              </a:rPr>
+              <a:t>Reaching a target – SKRL Model</a:t>
+            </a:r>
+            <a:endParaRPr lang="it-IT" dirty="0">
+              <a:latin typeface="Aptos SemiBold" panose="020B0004020202020204" pitchFamily="34" charset="0"/>
+            </a:endParaRPr>
+          </a:p>
+        </p:txBody>
+      </p:sp>
+      <p:pic>
+        <p:nvPicPr>
+          <p:cNvPr id="4" name="Immagine 3">
+            <a:extLst>
+              <a:ext uri="{FF2B5EF4-FFF2-40B4-BE49-F238E27FC236}">
+                <a16:creationId xmlns:a16="http://schemas.microsoft.com/office/drawing/2014/main" id="{CB1FFB52-928C-7EDA-3C3B-6E1F60CA0E58}"/>
+              </a:ext>
+            </a:extLst>
+          </p:cNvPr>
+          <p:cNvPicPr>
+            <a:picLocks noChangeAspect="1"/>
+          </p:cNvPicPr>
+          <p:nvPr/>
+        </p:nvPicPr>
+        <p:blipFill>
+          <a:blip r:embed="rId2"/>
+          <a:stretch>
+            <a:fillRect/>
+          </a:stretch>
+        </p:blipFill>
+        <p:spPr>
+          <a:xfrm>
+            <a:off x="838200" y="1487928"/>
+            <a:ext cx="6142782" cy="36000"/>
+          </a:xfrm>
+          <a:prstGeom prst="rect">
+            <a:avLst/>
+          </a:prstGeom>
+        </p:spPr>
+      </p:pic>
+      <p:sp>
+        <p:nvSpPr>
+          <p:cNvPr id="5" name="Segnaposto contenuto 2">
+            <a:extLst>
+              <a:ext uri="{FF2B5EF4-FFF2-40B4-BE49-F238E27FC236}">
+                <a16:creationId xmlns:a16="http://schemas.microsoft.com/office/drawing/2014/main" id="{5C886F07-EA7B-3583-3F0E-C33A5A18A369}"/>
+              </a:ext>
+            </a:extLst>
+          </p:cNvPr>
+          <p:cNvSpPr txBox="1">
+            <a:spLocks/>
+          </p:cNvSpPr>
+          <p:nvPr/>
+        </p:nvSpPr>
+        <p:spPr>
+          <a:xfrm>
+            <a:off x="990600" y="1978025"/>
+            <a:ext cx="4172339" cy="4351338"/>
+          </a:xfrm>
+          <a:prstGeom prst="rect">
+            <a:avLst/>
+          </a:prstGeom>
+        </p:spPr>
+        <p:txBody>
+          <a:bodyPr vert="horz" lIns="91440" tIns="45720" rIns="91440" bIns="45720" rtlCol="0">
+            <a:normAutofit/>
+          </a:bodyPr>
+          <a:lstStyle>
+            <a:lvl1pPr marL="228600" indent="-228600" algn="l" defTabSz="914400" rtl="0" eaLnBrk="1" latinLnBrk="0" hangingPunct="1">
+              <a:lnSpc>
+                <a:spcPct val="90000"/>
+              </a:lnSpc>
+              <a:spcBef>
+                <a:spcPts val="1000"/>
+              </a:spcBef>
+              <a:buFont typeface="Arial" panose="020B0604020202020204" pitchFamily="34" charset="0"/>
+              <a:buChar char="•"/>
+              <a:defRPr sz="2800" kern="1200">
+                <a:solidFill>
+                  <a:schemeClr val="tx1"/>
+                </a:solidFill>
+                <a:latin typeface="+mn-lt"/>
+                <a:ea typeface="+mn-ea"/>
+                <a:cs typeface="+mn-cs"/>
+              </a:defRPr>
+            </a:lvl1pPr>
+            <a:lvl2pPr marL="685800" indent="-228600" algn="l" defTabSz="914400" rtl="0" eaLnBrk="1" latinLnBrk="0" hangingPunct="1">
+              <a:lnSpc>
+                <a:spcPct val="90000"/>
+              </a:lnSpc>
+              <a:spcBef>
+                <a:spcPts val="500"/>
+              </a:spcBef>
+              <a:buFont typeface="Arial" panose="020B0604020202020204" pitchFamily="34" charset="0"/>
+              <a:buChar char="•"/>
+              <a:defRPr sz="2400" kern="1200">
+                <a:solidFill>
+                  <a:schemeClr val="tx1"/>
+                </a:solidFill>
+                <a:latin typeface="+mn-lt"/>
+                <a:ea typeface="+mn-ea"/>
+                <a:cs typeface="+mn-cs"/>
+              </a:defRPr>
+            </a:lvl2pPr>
+            <a:lvl3pPr marL="1143000" indent="-228600" algn="l" defTabSz="914400" rtl="0" eaLnBrk="1" latinLnBrk="0" hangingPunct="1">
+              <a:lnSpc>
+                <a:spcPct val="90000"/>
+              </a:lnSpc>
+              <a:spcBef>
+                <a:spcPts val="500"/>
+              </a:spcBef>
+              <a:buFont typeface="Arial" panose="020B0604020202020204" pitchFamily="34" charset="0"/>
+              <a:buChar char="•"/>
+              <a:defRPr sz="2000" kern="1200">
+                <a:solidFill>
+                  <a:schemeClr val="tx1"/>
+                </a:solidFill>
+                <a:latin typeface="+mn-lt"/>
+                <a:ea typeface="+mn-ea"/>
+                <a:cs typeface="+mn-cs"/>
+              </a:defRPr>
+            </a:lvl3pPr>
+            <a:lvl4pPr marL="1600200" indent="-228600" algn="l" defTabSz="914400" rtl="0" eaLnBrk="1" latinLnBrk="0" hangingPunct="1">
+              <a:lnSpc>
+                <a:spcPct val="90000"/>
+              </a:lnSpc>
+              <a:spcBef>
+                <a:spcPts val="500"/>
+              </a:spcBef>
+              <a:buFont typeface="Arial" panose="020B0604020202020204" pitchFamily="34" charset="0"/>
+              <a:buChar char="•"/>
+              <a:defRPr sz="1800" kern="1200">
+                <a:solidFill>
+                  <a:schemeClr val="tx1"/>
+                </a:solidFill>
+                <a:latin typeface="+mn-lt"/>
+                <a:ea typeface="+mn-ea"/>
+                <a:cs typeface="+mn-cs"/>
+              </a:defRPr>
+            </a:lvl4pPr>
+            <a:lvl5pPr marL="2057400" indent="-228600" algn="l" defTabSz="914400" rtl="0" eaLnBrk="1" latinLnBrk="0" hangingPunct="1">
+              <a:lnSpc>
+                <a:spcPct val="90000"/>
+              </a:lnSpc>
+              <a:spcBef>
+                <a:spcPts val="500"/>
+              </a:spcBef>
+              <a:buFont typeface="Arial" panose="020B0604020202020204" pitchFamily="34" charset="0"/>
+              <a:buChar char="•"/>
+              <a:defRPr sz="1800" kern="1200">
+                <a:solidFill>
+                  <a:schemeClr val="tx1"/>
+                </a:solidFill>
+                <a:latin typeface="+mn-lt"/>
+                <a:ea typeface="+mn-ea"/>
+                <a:cs typeface="+mn-cs"/>
+              </a:defRPr>
+            </a:lvl5pPr>
+            <a:lvl6pPr marL="2514600" indent="-228600" algn="l" defTabSz="914400" rtl="0" eaLnBrk="1" latinLnBrk="0" hangingPunct="1">
+              <a:lnSpc>
+                <a:spcPct val="90000"/>
+              </a:lnSpc>
+              <a:spcBef>
+                <a:spcPts val="500"/>
+              </a:spcBef>
+              <a:buFont typeface="Arial" panose="020B0604020202020204" pitchFamily="34" charset="0"/>
+              <a:buChar char="•"/>
+              <a:defRPr sz="1800" kern="1200">
+                <a:solidFill>
+                  <a:schemeClr val="tx1"/>
+                </a:solidFill>
+                <a:latin typeface="+mn-lt"/>
+                <a:ea typeface="+mn-ea"/>
+                <a:cs typeface="+mn-cs"/>
+              </a:defRPr>
+            </a:lvl6pPr>
+            <a:lvl7pPr marL="2971800" indent="-228600" algn="l" defTabSz="914400" rtl="0" eaLnBrk="1" latinLnBrk="0" hangingPunct="1">
+              <a:lnSpc>
+                <a:spcPct val="90000"/>
+              </a:lnSpc>
+              <a:spcBef>
+                <a:spcPts val="500"/>
+              </a:spcBef>
+              <a:buFont typeface="Arial" panose="020B0604020202020204" pitchFamily="34" charset="0"/>
+              <a:buChar char="•"/>
+              <a:defRPr sz="1800" kern="1200">
+                <a:solidFill>
+                  <a:schemeClr val="tx1"/>
+                </a:solidFill>
+                <a:latin typeface="+mn-lt"/>
+                <a:ea typeface="+mn-ea"/>
+                <a:cs typeface="+mn-cs"/>
+              </a:defRPr>
+            </a:lvl7pPr>
+            <a:lvl8pPr marL="3429000" indent="-228600" algn="l" defTabSz="914400" rtl="0" eaLnBrk="1" latinLnBrk="0" hangingPunct="1">
+              <a:lnSpc>
+                <a:spcPct val="90000"/>
+              </a:lnSpc>
+              <a:spcBef>
+                <a:spcPts val="500"/>
+              </a:spcBef>
+              <a:buFont typeface="Arial" panose="020B0604020202020204" pitchFamily="34" charset="0"/>
+              <a:buChar char="•"/>
+              <a:defRPr sz="1800" kern="1200">
+                <a:solidFill>
+                  <a:schemeClr val="tx1"/>
+                </a:solidFill>
+                <a:latin typeface="+mn-lt"/>
+                <a:ea typeface="+mn-ea"/>
+                <a:cs typeface="+mn-cs"/>
+              </a:defRPr>
+            </a:lvl8pPr>
+            <a:lvl9pPr marL="3886200" indent="-228600" algn="l" defTabSz="914400" rtl="0" eaLnBrk="1" latinLnBrk="0" hangingPunct="1">
+              <a:lnSpc>
+                <a:spcPct val="90000"/>
+              </a:lnSpc>
+              <a:spcBef>
+                <a:spcPts val="500"/>
+              </a:spcBef>
+              <a:buFont typeface="Arial" panose="020B0604020202020204" pitchFamily="34" charset="0"/>
+              <a:buChar char="•"/>
+              <a:defRPr sz="1800" kern="1200">
+                <a:solidFill>
+                  <a:schemeClr val="tx1"/>
+                </a:solidFill>
+                <a:latin typeface="+mn-lt"/>
+                <a:ea typeface="+mn-ea"/>
+                <a:cs typeface="+mn-cs"/>
+              </a:defRPr>
+            </a:lvl9pPr>
+          </a:lstStyle>
+          <a:p>
+            <a:endParaRPr lang="it-IT" sz="2400"/>
+          </a:p>
+          <a:p>
+            <a:endParaRPr lang="it-IT"/>
+          </a:p>
+          <a:p>
+            <a:endParaRPr lang="it-IT"/>
+          </a:p>
+          <a:p>
+            <a:endParaRPr lang="it-IT" dirty="0"/>
+          </a:p>
+        </p:txBody>
+      </p:sp>
+    </p:spTree>
+    <p:extLst>
+      <p:ext uri="{BB962C8B-B14F-4D97-AF65-F5344CB8AC3E}">
+        <p14:creationId xmlns:p14="http://schemas.microsoft.com/office/powerpoint/2010/main" val="3599238724"/>
+      </p:ext>
+    </p:extLst>
+  </p:cSld>
+  <p:clrMapOvr>
+    <a:masterClrMapping/>
+  </p:clrMapOvr>
+</p:sld>
+</file>
+
+<file path=ppt/slides/slide9.xml><?xml version="1.0" encoding="utf-8"?>
+<p:sld xmlns:a="http://schemas.openxmlformats.org/drawingml/2006/main" xmlns:r="http://schemas.openxmlformats.org/officeDocument/2006/relationships" xmlns:p="http://schemas.openxmlformats.org/presentationml/2006/main">
+  <p:cSld>
+    <p:spTree>
+      <p:nvGrpSpPr>
+        <p:cNvPr id="1" name=""/>
+        <p:cNvGrpSpPr/>
+        <p:nvPr/>
+      </p:nvGrpSpPr>
+      <p:grpSpPr>
+        <a:xfrm>
+          <a:off x="0" y="0"/>
+          <a:ext cx="0" cy="0"/>
+          <a:chOff x="0" y="0"/>
+          <a:chExt cx="0" cy="0"/>
+        </a:xfrm>
+      </p:grpSpPr>
+      <p:sp>
+        <p:nvSpPr>
+          <p:cNvPr id="2" name="Titolo 1">
+            <a:extLst>
+              <a:ext uri="{FF2B5EF4-FFF2-40B4-BE49-F238E27FC236}">
+                <a16:creationId xmlns:a16="http://schemas.microsoft.com/office/drawing/2014/main" id="{D5F58EEC-3A74-ACCB-9A51-3B63C7A951AF}"/>
+              </a:ext>
+            </a:extLst>
+          </p:cNvPr>
+          <p:cNvSpPr>
+            <a:spLocks noGrp="1"/>
+          </p:cNvSpPr>
+          <p:nvPr>
+            <p:ph type="title"/>
+          </p:nvPr>
+        </p:nvSpPr>
+        <p:spPr/>
+        <p:txBody>
+          <a:bodyPr>
+            <a:normAutofit/>
+          </a:bodyPr>
+          <a:lstStyle/>
+          <a:p>
+            <a:r>
+              <a:rPr lang="en-US" dirty="0">
+                <a:latin typeface="Aptos SemiBold" panose="020B0004020202020204" pitchFamily="34" charset="0"/>
+              </a:rPr>
+              <a:t>Reaching a target – Reward Function</a:t>
+            </a:r>
+            <a:endParaRPr lang="it-IT" dirty="0">
+              <a:latin typeface="Aptos SemiBold" panose="020B0004020202020204" pitchFamily="34" charset="0"/>
+            </a:endParaRPr>
+          </a:p>
+        </p:txBody>
+      </p:sp>
+      <p:pic>
+        <p:nvPicPr>
+          <p:cNvPr id="4" name="Immagine 3">
+            <a:extLst>
+              <a:ext uri="{FF2B5EF4-FFF2-40B4-BE49-F238E27FC236}">
+                <a16:creationId xmlns:a16="http://schemas.microsoft.com/office/drawing/2014/main" id="{CB1FFB52-928C-7EDA-3C3B-6E1F60CA0E58}"/>
+              </a:ext>
+            </a:extLst>
+          </p:cNvPr>
+          <p:cNvPicPr>
+            <a:picLocks noChangeAspect="1"/>
+          </p:cNvPicPr>
+          <p:nvPr/>
+        </p:nvPicPr>
+        <p:blipFill>
+          <a:blip r:embed="rId2"/>
+          <a:stretch>
+            <a:fillRect/>
+          </a:stretch>
+        </p:blipFill>
+        <p:spPr>
+          <a:xfrm>
+            <a:off x="838200" y="1487928"/>
+            <a:ext cx="6142782" cy="36000"/>
+          </a:xfrm>
+          <a:prstGeom prst="rect">
+            <a:avLst/>
+          </a:prstGeom>
+        </p:spPr>
+      </p:pic>
+      <p:sp>
+        <p:nvSpPr>
+          <p:cNvPr id="5" name="Segnaposto contenuto 2">
+            <a:extLst>
+              <a:ext uri="{FF2B5EF4-FFF2-40B4-BE49-F238E27FC236}">
+                <a16:creationId xmlns:a16="http://schemas.microsoft.com/office/drawing/2014/main" id="{5C886F07-EA7B-3583-3F0E-C33A5A18A369}"/>
+              </a:ext>
+            </a:extLst>
+          </p:cNvPr>
+          <p:cNvSpPr txBox="1">
+            <a:spLocks/>
+          </p:cNvSpPr>
+          <p:nvPr/>
+        </p:nvSpPr>
+        <p:spPr>
+          <a:xfrm>
+            <a:off x="990600" y="1978025"/>
+            <a:ext cx="4172339" cy="4351338"/>
+          </a:xfrm>
+          <a:prstGeom prst="rect">
+            <a:avLst/>
+          </a:prstGeom>
+        </p:spPr>
+        <p:txBody>
+          <a:bodyPr vert="horz" lIns="91440" tIns="45720" rIns="91440" bIns="45720" rtlCol="0">
+            <a:normAutofit/>
+          </a:bodyPr>
+          <a:lstStyle>
+            <a:lvl1pPr marL="228600" indent="-228600" algn="l" defTabSz="914400" rtl="0" eaLnBrk="1" latinLnBrk="0" hangingPunct="1">
+              <a:lnSpc>
+                <a:spcPct val="90000"/>
+              </a:lnSpc>
+              <a:spcBef>
+                <a:spcPts val="1000"/>
+              </a:spcBef>
+              <a:buFont typeface="Arial" panose="020B0604020202020204" pitchFamily="34" charset="0"/>
+              <a:buChar char="•"/>
+              <a:defRPr sz="2800" kern="1200">
+                <a:solidFill>
+                  <a:schemeClr val="tx1"/>
+                </a:solidFill>
+                <a:latin typeface="+mn-lt"/>
+                <a:ea typeface="+mn-ea"/>
+                <a:cs typeface="+mn-cs"/>
+              </a:defRPr>
+            </a:lvl1pPr>
+            <a:lvl2pPr marL="685800" indent="-228600" algn="l" defTabSz="914400" rtl="0" eaLnBrk="1" latinLnBrk="0" hangingPunct="1">
+              <a:lnSpc>
+                <a:spcPct val="90000"/>
+              </a:lnSpc>
+              <a:spcBef>
+                <a:spcPts val="500"/>
+              </a:spcBef>
+              <a:buFont typeface="Arial" panose="020B0604020202020204" pitchFamily="34" charset="0"/>
+              <a:buChar char="•"/>
+              <a:defRPr sz="2400" kern="1200">
+                <a:solidFill>
+                  <a:schemeClr val="tx1"/>
+                </a:solidFill>
+                <a:latin typeface="+mn-lt"/>
+                <a:ea typeface="+mn-ea"/>
+                <a:cs typeface="+mn-cs"/>
+              </a:defRPr>
+            </a:lvl2pPr>
+            <a:lvl3pPr marL="1143000" indent="-228600" algn="l" defTabSz="914400" rtl="0" eaLnBrk="1" latinLnBrk="0" hangingPunct="1">
+              <a:lnSpc>
+                <a:spcPct val="90000"/>
+              </a:lnSpc>
+              <a:spcBef>
+                <a:spcPts val="500"/>
+              </a:spcBef>
+              <a:buFont typeface="Arial" panose="020B0604020202020204" pitchFamily="34" charset="0"/>
+              <a:buChar char="•"/>
+              <a:defRPr sz="2000" kern="1200">
+                <a:solidFill>
+                  <a:schemeClr val="tx1"/>
+                </a:solidFill>
+                <a:latin typeface="+mn-lt"/>
+                <a:ea typeface="+mn-ea"/>
+                <a:cs typeface="+mn-cs"/>
+              </a:defRPr>
+            </a:lvl3pPr>
+            <a:lvl4pPr marL="1600200" indent="-228600" algn="l" defTabSz="914400" rtl="0" eaLnBrk="1" latinLnBrk="0" hangingPunct="1">
+              <a:lnSpc>
+                <a:spcPct val="90000"/>
+              </a:lnSpc>
+              <a:spcBef>
+                <a:spcPts val="500"/>
+              </a:spcBef>
+              <a:buFont typeface="Arial" panose="020B0604020202020204" pitchFamily="34" charset="0"/>
+              <a:buChar char="•"/>
+              <a:defRPr sz="1800" kern="1200">
+                <a:solidFill>
+                  <a:schemeClr val="tx1"/>
+                </a:solidFill>
+                <a:latin typeface="+mn-lt"/>
+                <a:ea typeface="+mn-ea"/>
+                <a:cs typeface="+mn-cs"/>
+              </a:defRPr>
+            </a:lvl4pPr>
+            <a:lvl5pPr marL="2057400" indent="-228600" algn="l" defTabSz="914400" rtl="0" eaLnBrk="1" latinLnBrk="0" hangingPunct="1">
+              <a:lnSpc>
+                <a:spcPct val="90000"/>
+              </a:lnSpc>
+              <a:spcBef>
+                <a:spcPts val="500"/>
+              </a:spcBef>
+              <a:buFont typeface="Arial" panose="020B0604020202020204" pitchFamily="34" charset="0"/>
+              <a:buChar char="•"/>
+              <a:defRPr sz="1800" kern="1200">
+                <a:solidFill>
+                  <a:schemeClr val="tx1"/>
+                </a:solidFill>
+                <a:latin typeface="+mn-lt"/>
+                <a:ea typeface="+mn-ea"/>
+                <a:cs typeface="+mn-cs"/>
+              </a:defRPr>
+            </a:lvl5pPr>
+            <a:lvl6pPr marL="2514600" indent="-228600" algn="l" defTabSz="914400" rtl="0" eaLnBrk="1" latinLnBrk="0" hangingPunct="1">
+              <a:lnSpc>
+                <a:spcPct val="90000"/>
+              </a:lnSpc>
+              <a:spcBef>
+                <a:spcPts val="500"/>
+              </a:spcBef>
+              <a:buFont typeface="Arial" panose="020B0604020202020204" pitchFamily="34" charset="0"/>
+              <a:buChar char="•"/>
+              <a:defRPr sz="1800" kern="1200">
+                <a:solidFill>
+                  <a:schemeClr val="tx1"/>
+                </a:solidFill>
+                <a:latin typeface="+mn-lt"/>
+                <a:ea typeface="+mn-ea"/>
+                <a:cs typeface="+mn-cs"/>
+              </a:defRPr>
+            </a:lvl6pPr>
+            <a:lvl7pPr marL="2971800" indent="-228600" algn="l" defTabSz="914400" rtl="0" eaLnBrk="1" latinLnBrk="0" hangingPunct="1">
+              <a:lnSpc>
+                <a:spcPct val="90000"/>
+              </a:lnSpc>
+              <a:spcBef>
+                <a:spcPts val="500"/>
+              </a:spcBef>
+              <a:buFont typeface="Arial" panose="020B0604020202020204" pitchFamily="34" charset="0"/>
+              <a:buChar char="•"/>
+              <a:defRPr sz="1800" kern="1200">
+                <a:solidFill>
+                  <a:schemeClr val="tx1"/>
+                </a:solidFill>
+                <a:latin typeface="+mn-lt"/>
+                <a:ea typeface="+mn-ea"/>
+                <a:cs typeface="+mn-cs"/>
+              </a:defRPr>
+            </a:lvl7pPr>
+            <a:lvl8pPr marL="3429000" indent="-228600" algn="l" defTabSz="914400" rtl="0" eaLnBrk="1" latinLnBrk="0" hangingPunct="1">
+              <a:lnSpc>
+                <a:spcPct val="90000"/>
+              </a:lnSpc>
+              <a:spcBef>
+                <a:spcPts val="500"/>
+              </a:spcBef>
+              <a:buFont typeface="Arial" panose="020B0604020202020204" pitchFamily="34" charset="0"/>
+              <a:buChar char="•"/>
+              <a:defRPr sz="1800" kern="1200">
+                <a:solidFill>
+                  <a:schemeClr val="tx1"/>
+                </a:solidFill>
+                <a:latin typeface="+mn-lt"/>
+                <a:ea typeface="+mn-ea"/>
+                <a:cs typeface="+mn-cs"/>
+              </a:defRPr>
+            </a:lvl8pPr>
+            <a:lvl9pPr marL="3886200" indent="-228600" algn="l" defTabSz="914400" rtl="0" eaLnBrk="1" latinLnBrk="0" hangingPunct="1">
+              <a:lnSpc>
+                <a:spcPct val="90000"/>
+              </a:lnSpc>
+              <a:spcBef>
+                <a:spcPts val="500"/>
+              </a:spcBef>
+              <a:buFont typeface="Arial" panose="020B0604020202020204" pitchFamily="34" charset="0"/>
+              <a:buChar char="•"/>
+              <a:defRPr sz="1800" kern="1200">
+                <a:solidFill>
+                  <a:schemeClr val="tx1"/>
+                </a:solidFill>
+                <a:latin typeface="+mn-lt"/>
+                <a:ea typeface="+mn-ea"/>
+                <a:cs typeface="+mn-cs"/>
+              </a:defRPr>
+            </a:lvl9pPr>
+          </a:lstStyle>
+          <a:p>
+            <a:endParaRPr lang="it-IT" sz="2400"/>
+          </a:p>
+          <a:p>
+            <a:endParaRPr lang="it-IT"/>
+          </a:p>
+          <a:p>
+            <a:endParaRPr lang="it-IT"/>
+          </a:p>
+          <a:p>
+            <a:endParaRPr lang="it-IT" dirty="0"/>
+          </a:p>
+        </p:txBody>
+      </p:sp>
+    </p:spTree>
+    <p:extLst>
+      <p:ext uri="{BB962C8B-B14F-4D97-AF65-F5344CB8AC3E}">
+        <p14:creationId xmlns:p14="http://schemas.microsoft.com/office/powerpoint/2010/main" val="2103946519"/>
+      </p:ext>
+    </p:extLst>
+  </p:cSld>
+  <p:clrMapOvr>
+    <a:masterClrMapping/>
+  </p:clrMapOvr>
+</p:sld>
+</file>
+
 <file path=ppt/theme/theme1.xml><?xml version="1.0" encoding="utf-8"?>
 <a:theme xmlns:a="http://schemas.openxmlformats.org/drawingml/2006/main" name="Tema di Office">
   <a:themeElements>

</xml_diff>

<commit_message>
added skrl model slide
</commit_message>
<xml_diff>
--- a/Slides.pptx
+++ b/Slides.pptx
@@ -18664,6 +18664,108 @@
       </p:grpSpPr>
       <p:sp>
         <p:nvSpPr>
+          <p:cNvPr id="8" name="Rectangle: Rounded Corners 7">
+            <a:extLst>
+              <a:ext uri="{FF2B5EF4-FFF2-40B4-BE49-F238E27FC236}">
+                <a16:creationId xmlns:a16="http://schemas.microsoft.com/office/drawing/2014/main" id="{9A511EFA-C739-88CB-42DD-EAF03AAA83F9}"/>
+              </a:ext>
+            </a:extLst>
+          </p:cNvPr>
+          <p:cNvSpPr/>
+          <p:nvPr/>
+        </p:nvSpPr>
+        <p:spPr>
+          <a:xfrm>
+            <a:off x="3472601" y="2317302"/>
+            <a:ext cx="3818511" cy="3885084"/>
+          </a:xfrm>
+          <a:prstGeom prst="roundRect">
+            <a:avLst>
+              <a:gd name="adj" fmla="val 8656"/>
+            </a:avLst>
+          </a:prstGeom>
+        </p:spPr>
+        <p:style>
+          <a:lnRef idx="2">
+            <a:schemeClr val="accent1"/>
+          </a:lnRef>
+          <a:fillRef idx="1">
+            <a:schemeClr val="lt1"/>
+          </a:fillRef>
+          <a:effectRef idx="0">
+            <a:schemeClr val="accent1"/>
+          </a:effectRef>
+          <a:fontRef idx="minor">
+            <a:schemeClr val="dk1"/>
+          </a:fontRef>
+        </p:style>
+        <p:txBody>
+          <a:bodyPr rtlCol="0" anchor="t" anchorCtr="0"/>
+          <a:lstStyle/>
+          <a:p>
+            <a:pPr algn="ctr"/>
+            <a:endParaRPr lang="it-IT" dirty="0"/>
+          </a:p>
+        </p:txBody>
+      </p:sp>
+      <p:sp>
+        <p:nvSpPr>
+          <p:cNvPr id="99" name="Rectangle: Rounded Corners 98">
+            <a:extLst>
+              <a:ext uri="{FF2B5EF4-FFF2-40B4-BE49-F238E27FC236}">
+                <a16:creationId xmlns:a16="http://schemas.microsoft.com/office/drawing/2014/main" id="{01BEA770-C534-0FAA-2E9E-0EFA58DA671F}"/>
+              </a:ext>
+            </a:extLst>
+          </p:cNvPr>
+          <p:cNvSpPr>
+            <a:spLocks/>
+          </p:cNvSpPr>
+          <p:nvPr/>
+        </p:nvSpPr>
+        <p:spPr>
+          <a:xfrm>
+            <a:off x="3141290" y="1792353"/>
+            <a:ext cx="8847510" cy="4596148"/>
+          </a:xfrm>
+          <a:prstGeom prst="roundRect">
+            <a:avLst>
+              <a:gd name="adj" fmla="val 5617"/>
+            </a:avLst>
+          </a:prstGeom>
+          <a:noFill/>
+          <a:ln>
+            <a:solidFill>
+              <a:schemeClr val="bg1">
+                <a:lumMod val="75000"/>
+              </a:schemeClr>
+            </a:solidFill>
+          </a:ln>
+        </p:spPr>
+        <p:style>
+          <a:lnRef idx="2">
+            <a:schemeClr val="accent1"/>
+          </a:lnRef>
+          <a:fillRef idx="1">
+            <a:schemeClr val="lt1"/>
+          </a:fillRef>
+          <a:effectRef idx="0">
+            <a:schemeClr val="accent1"/>
+          </a:effectRef>
+          <a:fontRef idx="minor">
+            <a:schemeClr val="dk1"/>
+          </a:fontRef>
+        </p:style>
+        <p:txBody>
+          <a:bodyPr rtlCol="0" anchor="ctr"/>
+          <a:lstStyle/>
+          <a:p>
+            <a:pPr algn="ctr"/>
+            <a:endParaRPr lang="it-IT" dirty="0"/>
+          </a:p>
+        </p:txBody>
+      </p:sp>
+      <p:sp>
+        <p:nvSpPr>
           <p:cNvPr id="2" name="Titolo 1">
             <a:extLst>
               <a:ext uri="{FF2B5EF4-FFF2-40B4-BE49-F238E27FC236}">
@@ -18727,211 +18829,1469 @@
           </a:prstGeom>
         </p:spPr>
       </p:pic>
-      <p:sp>
-        <p:nvSpPr>
-          <p:cNvPr id="5" name="Segnaposto contenuto 2">
+      <p:grpSp>
+        <p:nvGrpSpPr>
+          <p:cNvPr id="126" name="Group 125">
             <a:extLst>
               <a:ext uri="{FF2B5EF4-FFF2-40B4-BE49-F238E27FC236}">
-                <a16:creationId xmlns:a16="http://schemas.microsoft.com/office/drawing/2014/main" id="{5C886F07-EA7B-3583-3F0E-C33A5A18A369}"/>
+                <a16:creationId xmlns:a16="http://schemas.microsoft.com/office/drawing/2014/main" id="{7B17C830-57D2-EC2C-DC21-E64DBA1B1A5E}"/>
               </a:ext>
             </a:extLst>
           </p:cNvPr>
-          <p:cNvSpPr txBox="1">
-            <a:spLocks/>
-          </p:cNvSpPr>
+          <p:cNvGrpSpPr/>
+          <p:nvPr/>
+        </p:nvGrpSpPr>
+        <p:grpSpPr>
+          <a:xfrm>
+            <a:off x="7837503" y="3260202"/>
+            <a:ext cx="1840679" cy="1570814"/>
+            <a:chOff x="7954172" y="3272330"/>
+            <a:chExt cx="1840679" cy="1570814"/>
+          </a:xfrm>
+        </p:grpSpPr>
+        <p:sp>
+          <p:nvSpPr>
+            <p:cNvPr id="60" name="TextBox 59">
+              <a:extLst>
+                <a:ext uri="{FF2B5EF4-FFF2-40B4-BE49-F238E27FC236}">
+                  <a16:creationId xmlns:a16="http://schemas.microsoft.com/office/drawing/2014/main" id="{63E2F909-1E46-8372-31B1-0879D5D3F3A1}"/>
+                </a:ext>
+              </a:extLst>
+            </p:cNvPr>
+            <p:cNvSpPr txBox="1"/>
+            <p:nvPr/>
+          </p:nvSpPr>
+          <p:spPr>
+            <a:xfrm>
+              <a:off x="8405473" y="3272330"/>
+              <a:ext cx="938077" cy="369332"/>
+            </a:xfrm>
+            <a:prstGeom prst="rect">
+              <a:avLst/>
+            </a:prstGeom>
+            <a:noFill/>
+          </p:spPr>
+          <p:txBody>
+            <a:bodyPr wrap="none" rtlCol="0">
+              <a:spAutoFit/>
+            </a:bodyPr>
+            <a:lstStyle/>
+            <a:p>
+              <a:r>
+                <a:rPr lang="en-US" dirty="0"/>
+                <a:t>Actions</a:t>
+              </a:r>
+              <a:endParaRPr lang="it-IT" dirty="0"/>
+            </a:p>
+          </p:txBody>
+        </p:sp>
+        <p:grpSp>
+          <p:nvGrpSpPr>
+            <p:cNvPr id="125" name="Group 124">
+              <a:extLst>
+                <a:ext uri="{FF2B5EF4-FFF2-40B4-BE49-F238E27FC236}">
+                  <a16:creationId xmlns:a16="http://schemas.microsoft.com/office/drawing/2014/main" id="{23F60516-DCBA-0817-D950-AFFA8A8C0AD2}"/>
+                </a:ext>
+              </a:extLst>
+            </p:cNvPr>
+            <p:cNvGrpSpPr/>
+            <p:nvPr/>
+          </p:nvGrpSpPr>
+          <p:grpSpPr>
+            <a:xfrm>
+              <a:off x="7954172" y="3665468"/>
+              <a:ext cx="1840679" cy="1177676"/>
+              <a:chOff x="7954172" y="3665468"/>
+              <a:chExt cx="1840679" cy="1177676"/>
+            </a:xfrm>
+          </p:grpSpPr>
+          <p:sp>
+            <p:nvSpPr>
+              <p:cNvPr id="61" name="TextBox 60">
+                <a:extLst>
+                  <a:ext uri="{FF2B5EF4-FFF2-40B4-BE49-F238E27FC236}">
+                    <a16:creationId xmlns:a16="http://schemas.microsoft.com/office/drawing/2014/main" id="{781787CE-2637-76DF-97EE-7F2695873D77}"/>
+                  </a:ext>
+                </a:extLst>
+              </p:cNvPr>
+              <p:cNvSpPr txBox="1"/>
+              <p:nvPr/>
+            </p:nvSpPr>
+            <p:spPr>
+              <a:xfrm>
+                <a:off x="8746590" y="4146839"/>
+                <a:ext cx="1048261" cy="584775"/>
+              </a:xfrm>
+              <a:prstGeom prst="rect">
+                <a:avLst/>
+              </a:prstGeom>
+              <a:noFill/>
+            </p:spPr>
+            <p:txBody>
+              <a:bodyPr wrap="square" rtlCol="0">
+                <a:spAutoFit/>
+              </a:bodyPr>
+              <a:lstStyle/>
+              <a:p>
+                <a:r>
+                  <a:rPr lang="en-US" sz="1600" dirty="0">
+                    <a:solidFill>
+                      <a:schemeClr val="accent3"/>
+                    </a:solidFill>
+                  </a:rPr>
+                  <a:t>Linear Velocities</a:t>
+                </a:r>
+                <a:endParaRPr lang="it-IT" sz="1600" dirty="0">
+                  <a:solidFill>
+                    <a:schemeClr val="accent3"/>
+                  </a:solidFill>
+                </a:endParaRPr>
+              </a:p>
+            </p:txBody>
+          </p:sp>
+          <p:pic>
+            <p:nvPicPr>
+              <p:cNvPr id="55" name="Graphic 54">
+                <a:extLst>
+                  <a:ext uri="{FF2B5EF4-FFF2-40B4-BE49-F238E27FC236}">
+                    <a16:creationId xmlns:a16="http://schemas.microsoft.com/office/drawing/2014/main" id="{6FF80E69-A9B8-6857-4502-A050C6CD1F6E}"/>
+                  </a:ext>
+                </a:extLst>
+              </p:cNvPr>
+              <p:cNvPicPr>
+                <a:picLocks noChangeAspect="1"/>
+              </p:cNvPicPr>
+              <p:nvPr/>
+            </p:nvPicPr>
+            <p:blipFill>
+              <a:blip r:embed="rId3">
+                <a:extLst>
+                  <a:ext uri="{96DAC541-7B7A-43D3-8B79-37D633B846F1}">
+                    <asvg:svgBlip xmlns:asvg="http://schemas.microsoft.com/office/drawing/2016/SVG/main" r:embed="rId4"/>
+                  </a:ext>
+                </a:extLst>
+              </a:blip>
+              <a:stretch>
+                <a:fillRect/>
+              </a:stretch>
+            </p:blipFill>
+            <p:spPr>
+              <a:xfrm>
+                <a:off x="7954172" y="3676544"/>
+                <a:ext cx="566604" cy="1166600"/>
+              </a:xfrm>
+              <a:prstGeom prst="rect">
+                <a:avLst/>
+              </a:prstGeom>
+            </p:spPr>
+          </p:pic>
+          <p:sp>
+            <p:nvSpPr>
+              <p:cNvPr id="56" name="Left Brace 55">
+                <a:extLst>
+                  <a:ext uri="{FF2B5EF4-FFF2-40B4-BE49-F238E27FC236}">
+                    <a16:creationId xmlns:a16="http://schemas.microsoft.com/office/drawing/2014/main" id="{E55727D5-1BD0-8C4B-AAEA-698B3A54B129}"/>
+                  </a:ext>
+                </a:extLst>
+              </p:cNvPr>
+              <p:cNvSpPr/>
+              <p:nvPr/>
+            </p:nvSpPr>
+            <p:spPr>
+              <a:xfrm rot="10800000">
+                <a:off x="8562498" y="4081976"/>
+                <a:ext cx="205665" cy="714502"/>
+              </a:xfrm>
+              <a:prstGeom prst="leftBrace">
+                <a:avLst>
+                  <a:gd name="adj1" fmla="val 61263"/>
+                  <a:gd name="adj2" fmla="val 50000"/>
+                </a:avLst>
+              </a:prstGeom>
+              <a:ln>
+                <a:solidFill>
+                  <a:schemeClr val="accent3"/>
+                </a:solidFill>
+              </a:ln>
+            </p:spPr>
+            <p:style>
+              <a:lnRef idx="2">
+                <a:schemeClr val="accent1"/>
+              </a:lnRef>
+              <a:fillRef idx="0">
+                <a:schemeClr val="accent1"/>
+              </a:fillRef>
+              <a:effectRef idx="1">
+                <a:schemeClr val="accent1"/>
+              </a:effectRef>
+              <a:fontRef idx="minor">
+                <a:schemeClr val="tx1"/>
+              </a:fontRef>
+            </p:style>
+            <p:txBody>
+              <a:bodyPr rtlCol="0" anchor="ctr"/>
+              <a:lstStyle/>
+              <a:p>
+                <a:pPr algn="ctr"/>
+                <a:endParaRPr lang="it-IT" dirty="0">
+                  <a:solidFill>
+                    <a:schemeClr val="accent3"/>
+                  </a:solidFill>
+                </a:endParaRPr>
+              </a:p>
+            </p:txBody>
+          </p:sp>
+          <p:cxnSp>
+            <p:nvCxnSpPr>
+              <p:cNvPr id="64" name="Straight Arrow Connector 63">
+                <a:extLst>
+                  <a:ext uri="{FF2B5EF4-FFF2-40B4-BE49-F238E27FC236}">
+                    <a16:creationId xmlns:a16="http://schemas.microsoft.com/office/drawing/2014/main" id="{A6B9ECB1-0926-FA60-A89A-58F314643D95}"/>
+                  </a:ext>
+                </a:extLst>
+              </p:cNvPr>
+              <p:cNvCxnSpPr>
+                <a:cxnSpLocks/>
+              </p:cNvCxnSpPr>
+              <p:nvPr/>
+            </p:nvCxnSpPr>
+            <p:spPr>
+              <a:xfrm>
+                <a:off x="8542191" y="3834745"/>
+                <a:ext cx="205665" cy="0"/>
+              </a:xfrm>
+              <a:prstGeom prst="straightConnector1">
+                <a:avLst/>
+              </a:prstGeom>
+              <a:ln>
+                <a:tailEnd type="triangle"/>
+              </a:ln>
+            </p:spPr>
+            <p:style>
+              <a:lnRef idx="2">
+                <a:schemeClr val="accent1"/>
+              </a:lnRef>
+              <a:fillRef idx="0">
+                <a:schemeClr val="accent1"/>
+              </a:fillRef>
+              <a:effectRef idx="1">
+                <a:schemeClr val="accent1"/>
+              </a:effectRef>
+              <a:fontRef idx="minor">
+                <a:schemeClr val="tx1"/>
+              </a:fontRef>
+            </p:style>
+          </p:cxnSp>
+          <p:sp>
+            <p:nvSpPr>
+              <p:cNvPr id="66" name="TextBox 65">
+                <a:extLst>
+                  <a:ext uri="{FF2B5EF4-FFF2-40B4-BE49-F238E27FC236}">
+                    <a16:creationId xmlns:a16="http://schemas.microsoft.com/office/drawing/2014/main" id="{4BF18E8D-5206-8716-9E36-82FA77BDCEC2}"/>
+                  </a:ext>
+                </a:extLst>
+              </p:cNvPr>
+              <p:cNvSpPr txBox="1"/>
+              <p:nvPr/>
+            </p:nvSpPr>
+            <p:spPr>
+              <a:xfrm>
+                <a:off x="8732483" y="3665468"/>
+                <a:ext cx="1001090" cy="338554"/>
+              </a:xfrm>
+              <a:prstGeom prst="rect">
+                <a:avLst/>
+              </a:prstGeom>
+              <a:noFill/>
+            </p:spPr>
+            <p:txBody>
+              <a:bodyPr wrap="square" rtlCol="0">
+                <a:spAutoFit/>
+              </a:bodyPr>
+              <a:lstStyle/>
+              <a:p>
+                <a:r>
+                  <a:rPr lang="en-US" sz="1600" dirty="0">
+                    <a:solidFill>
+                      <a:schemeClr val="accent1"/>
+                    </a:solidFill>
+                  </a:rPr>
+                  <a:t>Yaw Rate</a:t>
+                </a:r>
+                <a:endParaRPr lang="it-IT" sz="1600" dirty="0">
+                  <a:solidFill>
+                    <a:schemeClr val="accent1"/>
+                  </a:solidFill>
+                </a:endParaRPr>
+              </a:p>
+            </p:txBody>
+          </p:sp>
+        </p:grpSp>
+      </p:grpSp>
+      <p:sp>
+        <p:nvSpPr>
+          <p:cNvPr id="75" name="Rectangle: Rounded Corners 74">
+            <a:extLst>
+              <a:ext uri="{FF2B5EF4-FFF2-40B4-BE49-F238E27FC236}">
+                <a16:creationId xmlns:a16="http://schemas.microsoft.com/office/drawing/2014/main" id="{8B88C7D9-9233-AF62-C0CD-641D729C8B68}"/>
+              </a:ext>
+            </a:extLst>
+          </p:cNvPr>
+          <p:cNvSpPr/>
           <p:nvPr/>
         </p:nvSpPr>
         <p:spPr>
           <a:xfrm>
-            <a:off x="990600" y="1978025"/>
-            <a:ext cx="4172339" cy="4351338"/>
+            <a:off x="10224574" y="3896163"/>
+            <a:ext cx="1509485" cy="696684"/>
+          </a:xfrm>
+          <a:prstGeom prst="roundRect">
+            <a:avLst/>
+          </a:prstGeom>
+        </p:spPr>
+        <p:style>
+          <a:lnRef idx="2">
+            <a:schemeClr val="accent1">
+              <a:shade val="15000"/>
+            </a:schemeClr>
+          </a:lnRef>
+          <a:fillRef idx="1">
+            <a:schemeClr val="accent1"/>
+          </a:fillRef>
+          <a:effectRef idx="0">
+            <a:schemeClr val="accent1"/>
+          </a:effectRef>
+          <a:fontRef idx="minor">
+            <a:schemeClr val="lt1"/>
+          </a:fontRef>
+        </p:style>
+        <p:txBody>
+          <a:bodyPr rtlCol="0" anchor="ctr"/>
+          <a:lstStyle/>
+          <a:p>
+            <a:pPr algn="ctr"/>
+            <a:r>
+              <a:rPr lang="en-US" dirty="0"/>
+              <a:t>Flight Controller</a:t>
+            </a:r>
+            <a:endParaRPr lang="it-IT" dirty="0"/>
+          </a:p>
+        </p:txBody>
+      </p:sp>
+      <p:sp>
+        <p:nvSpPr>
+          <p:cNvPr id="76" name="Right Brace 75">
+            <a:extLst>
+              <a:ext uri="{FF2B5EF4-FFF2-40B4-BE49-F238E27FC236}">
+                <a16:creationId xmlns:a16="http://schemas.microsoft.com/office/drawing/2014/main" id="{D5381AAB-7B25-8B7A-22CF-BDB3B93194C9}"/>
+              </a:ext>
+            </a:extLst>
+          </p:cNvPr>
+          <p:cNvSpPr/>
+          <p:nvPr/>
+        </p:nvSpPr>
+        <p:spPr>
+          <a:xfrm>
+            <a:off x="9628914" y="3657995"/>
+            <a:ext cx="297038" cy="1173021"/>
+          </a:xfrm>
+          <a:prstGeom prst="rightBrace">
+            <a:avLst>
+              <a:gd name="adj1" fmla="val 0"/>
+              <a:gd name="adj2" fmla="val 50000"/>
+            </a:avLst>
+          </a:prstGeom>
+        </p:spPr>
+        <p:style>
+          <a:lnRef idx="2">
+            <a:schemeClr val="dk1"/>
+          </a:lnRef>
+          <a:fillRef idx="0">
+            <a:schemeClr val="dk1"/>
+          </a:fillRef>
+          <a:effectRef idx="1">
+            <a:schemeClr val="dk1"/>
+          </a:effectRef>
+          <a:fontRef idx="minor">
+            <a:schemeClr val="tx1"/>
+          </a:fontRef>
+        </p:style>
+        <p:txBody>
+          <a:bodyPr rtlCol="0" anchor="ctr"/>
+          <a:lstStyle/>
+          <a:p>
+            <a:pPr algn="ctr"/>
+            <a:endParaRPr lang="it-IT" dirty="0"/>
+          </a:p>
+        </p:txBody>
+      </p:sp>
+      <p:grpSp>
+        <p:nvGrpSpPr>
+          <p:cNvPr id="95" name="Group 94">
+            <a:extLst>
+              <a:ext uri="{FF2B5EF4-FFF2-40B4-BE49-F238E27FC236}">
+                <a16:creationId xmlns:a16="http://schemas.microsoft.com/office/drawing/2014/main" id="{82F5D85D-C5B4-9A3F-286A-3DC17A8D4875}"/>
+              </a:ext>
+            </a:extLst>
+          </p:cNvPr>
+          <p:cNvGrpSpPr/>
+          <p:nvPr/>
+        </p:nvGrpSpPr>
+        <p:grpSpPr>
+          <a:xfrm>
+            <a:off x="128142" y="1792353"/>
+            <a:ext cx="3202887" cy="4965480"/>
+            <a:chOff x="128142" y="1966525"/>
+            <a:chExt cx="3202887" cy="4965480"/>
+          </a:xfrm>
+        </p:grpSpPr>
+        <p:sp>
+          <p:nvSpPr>
+            <p:cNvPr id="93" name="Rectangle: Rounded Corners 92">
+              <a:extLst>
+                <a:ext uri="{FF2B5EF4-FFF2-40B4-BE49-F238E27FC236}">
+                  <a16:creationId xmlns:a16="http://schemas.microsoft.com/office/drawing/2014/main" id="{17D95BAD-CF43-12B5-D736-0F22D557D561}"/>
+                </a:ext>
+              </a:extLst>
+            </p:cNvPr>
+            <p:cNvSpPr/>
+            <p:nvPr/>
+          </p:nvSpPr>
+          <p:spPr>
+            <a:xfrm>
+              <a:off x="128142" y="1966525"/>
+              <a:ext cx="2627086" cy="4579247"/>
+            </a:xfrm>
+            <a:prstGeom prst="roundRect">
+              <a:avLst>
+                <a:gd name="adj" fmla="val 5617"/>
+              </a:avLst>
+            </a:prstGeom>
+            <a:noFill/>
+            <a:ln>
+              <a:solidFill>
+                <a:schemeClr val="bg1">
+                  <a:lumMod val="75000"/>
+                </a:schemeClr>
+              </a:solidFill>
+            </a:ln>
+          </p:spPr>
+          <p:style>
+            <a:lnRef idx="2">
+              <a:schemeClr val="accent1"/>
+            </a:lnRef>
+            <a:fillRef idx="1">
+              <a:schemeClr val="lt1"/>
+            </a:fillRef>
+            <a:effectRef idx="0">
+              <a:schemeClr val="accent1"/>
+            </a:effectRef>
+            <a:fontRef idx="minor">
+              <a:schemeClr val="dk1"/>
+            </a:fontRef>
+          </p:style>
+          <p:txBody>
+            <a:bodyPr rtlCol="0" anchor="ctr"/>
+            <a:lstStyle/>
+            <a:p>
+              <a:pPr algn="ctr"/>
+              <a:endParaRPr lang="it-IT" dirty="0"/>
+            </a:p>
+          </p:txBody>
+        </p:sp>
+        <p:grpSp>
+          <p:nvGrpSpPr>
+            <p:cNvPr id="84" name="Group 83">
+              <a:extLst>
+                <a:ext uri="{FF2B5EF4-FFF2-40B4-BE49-F238E27FC236}">
+                  <a16:creationId xmlns:a16="http://schemas.microsoft.com/office/drawing/2014/main" id="{0542501E-2185-C85B-1A7A-6F72A5C904CC}"/>
+                </a:ext>
+              </a:extLst>
+            </p:cNvPr>
+            <p:cNvGrpSpPr/>
+            <p:nvPr/>
+          </p:nvGrpSpPr>
+          <p:grpSpPr>
+            <a:xfrm>
+              <a:off x="286731" y="2489885"/>
+              <a:ext cx="2190377" cy="3884633"/>
+              <a:chOff x="1635322" y="2453615"/>
+              <a:chExt cx="2190377" cy="3884633"/>
+            </a:xfrm>
+          </p:grpSpPr>
+          <p:pic>
+            <p:nvPicPr>
+              <p:cNvPr id="13" name="Graphic 12">
+                <a:extLst>
+                  <a:ext uri="{FF2B5EF4-FFF2-40B4-BE49-F238E27FC236}">
+                    <a16:creationId xmlns:a16="http://schemas.microsoft.com/office/drawing/2014/main" id="{056C63BC-BC08-C1AB-23EF-34836002BE4A}"/>
+                  </a:ext>
+                </a:extLst>
+              </p:cNvPr>
+              <p:cNvPicPr>
+                <a:picLocks noChangeAspect="1"/>
+              </p:cNvPicPr>
+              <p:nvPr/>
+            </p:nvPicPr>
+            <p:blipFill>
+              <a:blip r:embed="rId5">
+                <a:extLst>
+                  <a:ext uri="{96DAC541-7B7A-43D3-8B79-37D633B846F1}">
+                    <asvg:svgBlip xmlns:asvg="http://schemas.microsoft.com/office/drawing/2016/SVG/main" r:embed="rId6"/>
+                  </a:ext>
+                </a:extLst>
+              </a:blip>
+              <a:stretch>
+                <a:fillRect/>
+              </a:stretch>
+            </p:blipFill>
+            <p:spPr>
+              <a:xfrm>
+                <a:off x="1635322" y="2453615"/>
+                <a:ext cx="597924" cy="3877859"/>
+              </a:xfrm>
+              <a:prstGeom prst="rect">
+                <a:avLst/>
+              </a:prstGeom>
+            </p:spPr>
+          </p:pic>
+          <p:sp>
+            <p:nvSpPr>
+              <p:cNvPr id="16" name="Left Brace 15">
+                <a:extLst>
+                  <a:ext uri="{FF2B5EF4-FFF2-40B4-BE49-F238E27FC236}">
+                    <a16:creationId xmlns:a16="http://schemas.microsoft.com/office/drawing/2014/main" id="{D698D228-FB12-BA20-2E82-94E79DFE88F3}"/>
+                  </a:ext>
+                </a:extLst>
+              </p:cNvPr>
+              <p:cNvSpPr/>
+              <p:nvPr/>
+            </p:nvSpPr>
+            <p:spPr>
+              <a:xfrm rot="10800000">
+                <a:off x="2242456" y="2453615"/>
+                <a:ext cx="205665" cy="783073"/>
+              </a:xfrm>
+              <a:prstGeom prst="leftBrace">
+                <a:avLst>
+                  <a:gd name="adj1" fmla="val 61263"/>
+                  <a:gd name="adj2" fmla="val 50000"/>
+                </a:avLst>
+              </a:prstGeom>
+            </p:spPr>
+            <p:style>
+              <a:lnRef idx="2">
+                <a:schemeClr val="accent1"/>
+              </a:lnRef>
+              <a:fillRef idx="0">
+                <a:schemeClr val="accent1"/>
+              </a:fillRef>
+              <a:effectRef idx="1">
+                <a:schemeClr val="accent1"/>
+              </a:effectRef>
+              <a:fontRef idx="minor">
+                <a:schemeClr val="tx1"/>
+              </a:fontRef>
+            </p:style>
+            <p:txBody>
+              <a:bodyPr rtlCol="0" anchor="ctr"/>
+              <a:lstStyle/>
+              <a:p>
+                <a:pPr algn="ctr"/>
+                <a:endParaRPr lang="it-IT"/>
+              </a:p>
+            </p:txBody>
+          </p:sp>
+          <p:sp>
+            <p:nvSpPr>
+              <p:cNvPr id="18" name="Left Brace 17">
+                <a:extLst>
+                  <a:ext uri="{FF2B5EF4-FFF2-40B4-BE49-F238E27FC236}">
+                    <a16:creationId xmlns:a16="http://schemas.microsoft.com/office/drawing/2014/main" id="{6A317C52-17DA-020E-BCC6-1B6F23ACD454}"/>
+                  </a:ext>
+                </a:extLst>
+              </p:cNvPr>
+              <p:cNvSpPr/>
+              <p:nvPr/>
+            </p:nvSpPr>
+            <p:spPr>
+              <a:xfrm rot="10800000">
+                <a:off x="2236501" y="3382578"/>
+                <a:ext cx="205665" cy="1097744"/>
+              </a:xfrm>
+              <a:prstGeom prst="leftBrace">
+                <a:avLst>
+                  <a:gd name="adj1" fmla="val 61263"/>
+                  <a:gd name="adj2" fmla="val 50000"/>
+                </a:avLst>
+              </a:prstGeom>
+              <a:ln>
+                <a:solidFill>
+                  <a:schemeClr val="accent2"/>
+                </a:solidFill>
+              </a:ln>
+            </p:spPr>
+            <p:style>
+              <a:lnRef idx="2">
+                <a:schemeClr val="accent1"/>
+              </a:lnRef>
+              <a:fillRef idx="0">
+                <a:schemeClr val="accent1"/>
+              </a:fillRef>
+              <a:effectRef idx="1">
+                <a:schemeClr val="accent1"/>
+              </a:effectRef>
+              <a:fontRef idx="minor">
+                <a:schemeClr val="tx1"/>
+              </a:fontRef>
+            </p:style>
+            <p:txBody>
+              <a:bodyPr rtlCol="0" anchor="ctr"/>
+              <a:lstStyle/>
+              <a:p>
+                <a:pPr algn="ctr"/>
+                <a:endParaRPr lang="it-IT"/>
+              </a:p>
+            </p:txBody>
+          </p:sp>
+          <p:sp>
+            <p:nvSpPr>
+              <p:cNvPr id="19" name="Left Brace 18">
+                <a:extLst>
+                  <a:ext uri="{FF2B5EF4-FFF2-40B4-BE49-F238E27FC236}">
+                    <a16:creationId xmlns:a16="http://schemas.microsoft.com/office/drawing/2014/main" id="{1DAE7E2A-9BEB-79B7-F4B5-888C718A7EC3}"/>
+                  </a:ext>
+                </a:extLst>
+              </p:cNvPr>
+              <p:cNvSpPr/>
+              <p:nvPr/>
+            </p:nvSpPr>
+            <p:spPr>
+              <a:xfrm rot="10800000">
+                <a:off x="2242233" y="4626212"/>
+                <a:ext cx="205665" cy="783073"/>
+              </a:xfrm>
+              <a:prstGeom prst="leftBrace">
+                <a:avLst>
+                  <a:gd name="adj1" fmla="val 61263"/>
+                  <a:gd name="adj2" fmla="val 50000"/>
+                </a:avLst>
+              </a:prstGeom>
+              <a:ln>
+                <a:solidFill>
+                  <a:schemeClr val="accent3"/>
+                </a:solidFill>
+              </a:ln>
+            </p:spPr>
+            <p:style>
+              <a:lnRef idx="2">
+                <a:schemeClr val="accent1"/>
+              </a:lnRef>
+              <a:fillRef idx="0">
+                <a:schemeClr val="accent1"/>
+              </a:fillRef>
+              <a:effectRef idx="1">
+                <a:schemeClr val="accent1"/>
+              </a:effectRef>
+              <a:fontRef idx="minor">
+                <a:schemeClr val="tx1"/>
+              </a:fontRef>
+            </p:style>
+            <p:txBody>
+              <a:bodyPr rtlCol="0" anchor="ctr"/>
+              <a:lstStyle/>
+              <a:p>
+                <a:pPr algn="ctr"/>
+                <a:endParaRPr lang="it-IT"/>
+              </a:p>
+            </p:txBody>
+          </p:sp>
+          <p:sp>
+            <p:nvSpPr>
+              <p:cNvPr id="20" name="Left Brace 19">
+                <a:extLst>
+                  <a:ext uri="{FF2B5EF4-FFF2-40B4-BE49-F238E27FC236}">
+                    <a16:creationId xmlns:a16="http://schemas.microsoft.com/office/drawing/2014/main" id="{AFF2842F-32BB-37A0-6811-23D6E23985D5}"/>
+                  </a:ext>
+                </a:extLst>
+              </p:cNvPr>
+              <p:cNvSpPr/>
+              <p:nvPr/>
+            </p:nvSpPr>
+            <p:spPr>
+              <a:xfrm rot="10800000">
+                <a:off x="2246389" y="5555175"/>
+                <a:ext cx="205665" cy="783073"/>
+              </a:xfrm>
+              <a:prstGeom prst="leftBrace">
+                <a:avLst>
+                  <a:gd name="adj1" fmla="val 61263"/>
+                  <a:gd name="adj2" fmla="val 50000"/>
+                </a:avLst>
+              </a:prstGeom>
+              <a:ln>
+                <a:solidFill>
+                  <a:schemeClr val="accent5"/>
+                </a:solidFill>
+              </a:ln>
+            </p:spPr>
+            <p:style>
+              <a:lnRef idx="2">
+                <a:schemeClr val="accent1"/>
+              </a:lnRef>
+              <a:fillRef idx="0">
+                <a:schemeClr val="accent1"/>
+              </a:fillRef>
+              <a:effectRef idx="1">
+                <a:schemeClr val="accent1"/>
+              </a:effectRef>
+              <a:fontRef idx="minor">
+                <a:schemeClr val="tx1"/>
+              </a:fontRef>
+            </p:style>
+            <p:txBody>
+              <a:bodyPr rtlCol="0" anchor="ctr"/>
+              <a:lstStyle/>
+              <a:p>
+                <a:pPr algn="ctr"/>
+                <a:endParaRPr lang="it-IT"/>
+              </a:p>
+            </p:txBody>
+          </p:sp>
+          <p:sp>
+            <p:nvSpPr>
+              <p:cNvPr id="21" name="TextBox 20">
+                <a:extLst>
+                  <a:ext uri="{FF2B5EF4-FFF2-40B4-BE49-F238E27FC236}">
+                    <a16:creationId xmlns:a16="http://schemas.microsoft.com/office/drawing/2014/main" id="{76FD191B-0468-3381-7745-EBD0C8E635A1}"/>
+                  </a:ext>
+                </a:extLst>
+              </p:cNvPr>
+              <p:cNvSpPr txBox="1"/>
+              <p:nvPr/>
+            </p:nvSpPr>
+            <p:spPr>
+              <a:xfrm>
+                <a:off x="2436750" y="2675874"/>
+                <a:ext cx="901529" cy="338554"/>
+              </a:xfrm>
+              <a:prstGeom prst="rect">
+                <a:avLst/>
+              </a:prstGeom>
+              <a:noFill/>
+            </p:spPr>
+            <p:txBody>
+              <a:bodyPr wrap="none" rtlCol="0">
+                <a:spAutoFit/>
+              </a:bodyPr>
+              <a:lstStyle/>
+              <a:p>
+                <a:r>
+                  <a:rPr lang="en-US" sz="1600" dirty="0">
+                    <a:solidFill>
+                      <a:schemeClr val="accent1"/>
+                    </a:solidFill>
+                  </a:rPr>
+                  <a:t>Position</a:t>
+                </a:r>
+                <a:endParaRPr lang="it-IT" sz="1600" dirty="0">
+                  <a:solidFill>
+                    <a:schemeClr val="accent1"/>
+                  </a:solidFill>
+                </a:endParaRPr>
+              </a:p>
+            </p:txBody>
+          </p:sp>
+          <p:sp>
+            <p:nvSpPr>
+              <p:cNvPr id="23" name="TextBox 22">
+                <a:extLst>
+                  <a:ext uri="{FF2B5EF4-FFF2-40B4-BE49-F238E27FC236}">
+                    <a16:creationId xmlns:a16="http://schemas.microsoft.com/office/drawing/2014/main" id="{6177FA51-0266-EB1B-425A-3C8E935069DF}"/>
+                  </a:ext>
+                </a:extLst>
+              </p:cNvPr>
+              <p:cNvSpPr txBox="1"/>
+              <p:nvPr/>
+            </p:nvSpPr>
+            <p:spPr>
+              <a:xfrm>
+                <a:off x="2436750" y="3762173"/>
+                <a:ext cx="1190326" cy="338554"/>
+              </a:xfrm>
+              <a:prstGeom prst="rect">
+                <a:avLst/>
+              </a:prstGeom>
+              <a:noFill/>
+            </p:spPr>
+            <p:txBody>
+              <a:bodyPr wrap="none" rtlCol="0">
+                <a:spAutoFit/>
+              </a:bodyPr>
+              <a:lstStyle/>
+              <a:p>
+                <a:r>
+                  <a:rPr lang="en-US" sz="1600" dirty="0">
+                    <a:solidFill>
+                      <a:schemeClr val="accent2"/>
+                    </a:solidFill>
+                  </a:rPr>
+                  <a:t>Orientation</a:t>
+                </a:r>
+                <a:endParaRPr lang="it-IT" sz="1600" dirty="0">
+                  <a:solidFill>
+                    <a:schemeClr val="accent2"/>
+                  </a:solidFill>
+                </a:endParaRPr>
+              </a:p>
+            </p:txBody>
+          </p:sp>
+          <p:sp>
+            <p:nvSpPr>
+              <p:cNvPr id="24" name="TextBox 23">
+                <a:extLst>
+                  <a:ext uri="{FF2B5EF4-FFF2-40B4-BE49-F238E27FC236}">
+                    <a16:creationId xmlns:a16="http://schemas.microsoft.com/office/drawing/2014/main" id="{0804D9FF-4377-1830-6203-EB50E198255C}"/>
+                  </a:ext>
+                </a:extLst>
+              </p:cNvPr>
+              <p:cNvSpPr txBox="1"/>
+              <p:nvPr/>
+            </p:nvSpPr>
+            <p:spPr>
+              <a:xfrm>
+                <a:off x="2443941" y="4721534"/>
+                <a:ext cx="1381758" cy="584775"/>
+              </a:xfrm>
+              <a:prstGeom prst="rect">
+                <a:avLst/>
+              </a:prstGeom>
+              <a:noFill/>
+            </p:spPr>
+            <p:txBody>
+              <a:bodyPr wrap="square" rtlCol="0">
+                <a:spAutoFit/>
+              </a:bodyPr>
+              <a:lstStyle/>
+              <a:p>
+                <a:r>
+                  <a:rPr lang="en-US" sz="1600" dirty="0">
+                    <a:solidFill>
+                      <a:schemeClr val="accent3"/>
+                    </a:solidFill>
+                  </a:rPr>
+                  <a:t>Linear Velocities</a:t>
+                </a:r>
+                <a:endParaRPr lang="it-IT" sz="1600" dirty="0">
+                  <a:solidFill>
+                    <a:schemeClr val="accent3"/>
+                  </a:solidFill>
+                </a:endParaRPr>
+              </a:p>
+            </p:txBody>
+          </p:sp>
+          <p:sp>
+            <p:nvSpPr>
+              <p:cNvPr id="25" name="TextBox 24">
+                <a:extLst>
+                  <a:ext uri="{FF2B5EF4-FFF2-40B4-BE49-F238E27FC236}">
+                    <a16:creationId xmlns:a16="http://schemas.microsoft.com/office/drawing/2014/main" id="{576A7512-DFE0-330C-44F2-1E87BFD03064}"/>
+                  </a:ext>
+                </a:extLst>
+              </p:cNvPr>
+              <p:cNvSpPr txBox="1"/>
+              <p:nvPr/>
+            </p:nvSpPr>
+            <p:spPr>
+              <a:xfrm>
+                <a:off x="2436750" y="5658151"/>
+                <a:ext cx="1381758" cy="584775"/>
+              </a:xfrm>
+              <a:prstGeom prst="rect">
+                <a:avLst/>
+              </a:prstGeom>
+              <a:noFill/>
+            </p:spPr>
+            <p:txBody>
+              <a:bodyPr wrap="square" rtlCol="0">
+                <a:spAutoFit/>
+              </a:bodyPr>
+              <a:lstStyle/>
+              <a:p>
+                <a:r>
+                  <a:rPr lang="en-US" sz="1600" dirty="0">
+                    <a:solidFill>
+                      <a:schemeClr val="accent5"/>
+                    </a:solidFill>
+                  </a:rPr>
+                  <a:t>Angular Velocities</a:t>
+                </a:r>
+                <a:endParaRPr lang="it-IT" sz="1600" dirty="0">
+                  <a:solidFill>
+                    <a:schemeClr val="accent5"/>
+                  </a:solidFill>
+                </a:endParaRPr>
+              </a:p>
+            </p:txBody>
+          </p:sp>
+        </p:grpSp>
+        <p:sp>
+          <p:nvSpPr>
+            <p:cNvPr id="27" name="TextBox 26">
+              <a:extLst>
+                <a:ext uri="{FF2B5EF4-FFF2-40B4-BE49-F238E27FC236}">
+                  <a16:creationId xmlns:a16="http://schemas.microsoft.com/office/drawing/2014/main" id="{198D8D6F-3E66-9323-5E0D-FE10A67C25AE}"/>
+                </a:ext>
+              </a:extLst>
+            </p:cNvPr>
+            <p:cNvSpPr txBox="1"/>
+            <p:nvPr/>
+          </p:nvSpPr>
+          <p:spPr>
+            <a:xfrm>
+              <a:off x="623218" y="2030439"/>
+              <a:ext cx="1517403" cy="369332"/>
+            </a:xfrm>
+            <a:prstGeom prst="rect">
+              <a:avLst/>
+            </a:prstGeom>
+            <a:noFill/>
+          </p:spPr>
+          <p:txBody>
+            <a:bodyPr wrap="none" rtlCol="0">
+              <a:spAutoFit/>
+            </a:bodyPr>
+            <a:lstStyle/>
+            <a:p>
+              <a:r>
+                <a:rPr lang="en-US" dirty="0"/>
+                <a:t>Observations</a:t>
+              </a:r>
+              <a:endParaRPr lang="it-IT" dirty="0"/>
+            </a:p>
+          </p:txBody>
+        </p:sp>
+        <p:sp>
+          <p:nvSpPr>
+            <p:cNvPr id="34" name="Right Brace 33">
+              <a:extLst>
+                <a:ext uri="{FF2B5EF4-FFF2-40B4-BE49-F238E27FC236}">
+                  <a16:creationId xmlns:a16="http://schemas.microsoft.com/office/drawing/2014/main" id="{BE3DF1C0-B464-5A00-45BC-AAF4C11CCE6A}"/>
+                </a:ext>
+              </a:extLst>
+            </p:cNvPr>
+            <p:cNvSpPr/>
+            <p:nvPr/>
+          </p:nvSpPr>
+          <p:spPr>
+            <a:xfrm>
+              <a:off x="2388022" y="2489432"/>
+              <a:ext cx="297038" cy="3875330"/>
+            </a:xfrm>
+            <a:prstGeom prst="rightBrace">
+              <a:avLst>
+                <a:gd name="adj1" fmla="val 0"/>
+                <a:gd name="adj2" fmla="val 50000"/>
+              </a:avLst>
+            </a:prstGeom>
+          </p:spPr>
+          <p:style>
+            <a:lnRef idx="2">
+              <a:schemeClr val="dk1"/>
+            </a:lnRef>
+            <a:fillRef idx="0">
+              <a:schemeClr val="dk1"/>
+            </a:fillRef>
+            <a:effectRef idx="1">
+              <a:schemeClr val="dk1"/>
+            </a:effectRef>
+            <a:fontRef idx="minor">
+              <a:schemeClr val="tx1"/>
+            </a:fontRef>
+          </p:style>
+          <p:txBody>
+            <a:bodyPr rtlCol="0" anchor="ctr"/>
+            <a:lstStyle/>
+            <a:p>
+              <a:pPr algn="ctr"/>
+              <a:endParaRPr lang="it-IT" dirty="0"/>
+            </a:p>
+          </p:txBody>
+        </p:sp>
+        <p:cxnSp>
+          <p:nvCxnSpPr>
+            <p:cNvPr id="87" name="Straight Arrow Connector 86">
+              <a:extLst>
+                <a:ext uri="{FF2B5EF4-FFF2-40B4-BE49-F238E27FC236}">
+                  <a16:creationId xmlns:a16="http://schemas.microsoft.com/office/drawing/2014/main" id="{954CBD1A-9292-8F69-26DF-B7936B53F9C2}"/>
+                </a:ext>
+              </a:extLst>
+            </p:cNvPr>
+            <p:cNvCxnSpPr>
+              <a:cxnSpLocks/>
+              <a:stCxn id="34" idx="1"/>
+            </p:cNvCxnSpPr>
+            <p:nvPr/>
+          </p:nvCxnSpPr>
+          <p:spPr>
+            <a:xfrm>
+              <a:off x="2685060" y="4427097"/>
+              <a:ext cx="645969" cy="0"/>
+            </a:xfrm>
+            <a:prstGeom prst="straightConnector1">
+              <a:avLst/>
+            </a:prstGeom>
+            <a:ln>
+              <a:tailEnd type="triangle"/>
+            </a:ln>
+          </p:spPr>
+          <p:style>
+            <a:lnRef idx="2">
+              <a:schemeClr val="dk1"/>
+            </a:lnRef>
+            <a:fillRef idx="0">
+              <a:schemeClr val="dk1"/>
+            </a:fillRef>
+            <a:effectRef idx="1">
+              <a:schemeClr val="dk1"/>
+            </a:effectRef>
+            <a:fontRef idx="minor">
+              <a:schemeClr val="tx1"/>
+            </a:fontRef>
+          </p:style>
+        </p:cxnSp>
+        <p:sp>
+          <p:nvSpPr>
+            <p:cNvPr id="94" name="TextBox 93">
+              <a:extLst>
+                <a:ext uri="{FF2B5EF4-FFF2-40B4-BE49-F238E27FC236}">
+                  <a16:creationId xmlns:a16="http://schemas.microsoft.com/office/drawing/2014/main" id="{B7B1045C-975A-9DA3-A360-DF885B808AB1}"/>
+                </a:ext>
+              </a:extLst>
+            </p:cNvPr>
+            <p:cNvSpPr txBox="1"/>
+            <p:nvPr/>
+          </p:nvSpPr>
+          <p:spPr>
+            <a:xfrm>
+              <a:off x="659349" y="6562673"/>
+              <a:ext cx="1445139" cy="369332"/>
+            </a:xfrm>
+            <a:prstGeom prst="rect">
+              <a:avLst/>
+            </a:prstGeom>
+            <a:noFill/>
+          </p:spPr>
+          <p:txBody>
+            <a:bodyPr wrap="none" rtlCol="0">
+              <a:spAutoFit/>
+            </a:bodyPr>
+            <a:lstStyle/>
+            <a:p>
+              <a:r>
+                <a:rPr lang="en-US" dirty="0">
+                  <a:solidFill>
+                    <a:schemeClr val="bg1">
+                      <a:lumMod val="65000"/>
+                    </a:schemeClr>
+                  </a:solidFill>
+                </a:rPr>
+                <a:t>Environment</a:t>
+              </a:r>
+              <a:endParaRPr lang="it-IT" dirty="0">
+                <a:solidFill>
+                  <a:schemeClr val="bg1">
+                    <a:lumMod val="65000"/>
+                  </a:schemeClr>
+                </a:solidFill>
+              </a:endParaRPr>
+            </a:p>
+          </p:txBody>
+        </p:sp>
+      </p:grpSp>
+      <p:sp>
+        <p:nvSpPr>
+          <p:cNvPr id="100" name="TextBox 99">
+            <a:extLst>
+              <a:ext uri="{FF2B5EF4-FFF2-40B4-BE49-F238E27FC236}">
+                <a16:creationId xmlns:a16="http://schemas.microsoft.com/office/drawing/2014/main" id="{3A45E90D-66EE-51C8-6D65-AAA93C3683D9}"/>
+              </a:ext>
+            </a:extLst>
+          </p:cNvPr>
+          <p:cNvSpPr txBox="1"/>
+          <p:nvPr/>
+        </p:nvSpPr>
+        <p:spPr>
+          <a:xfrm>
+            <a:off x="7276598" y="6382677"/>
+            <a:ext cx="759695" cy="369332"/>
           </a:xfrm>
           <a:prstGeom prst="rect">
             <a:avLst/>
           </a:prstGeom>
+          <a:noFill/>
         </p:spPr>
         <p:txBody>
-          <a:bodyPr vert="horz" lIns="91440" tIns="45720" rIns="91440" bIns="45720" rtlCol="0">
-            <a:normAutofit/>
+          <a:bodyPr wrap="none" rtlCol="0">
+            <a:spAutoFit/>
           </a:bodyPr>
-          <a:lstStyle>
-            <a:lvl1pPr marL="228600" indent="-228600" algn="l" defTabSz="914400" rtl="0" eaLnBrk="1" latinLnBrk="0" hangingPunct="1">
-              <a:lnSpc>
-                <a:spcPct val="90000"/>
-              </a:lnSpc>
-              <a:spcBef>
-                <a:spcPts val="1000"/>
-              </a:spcBef>
-              <a:buFont typeface="Arial" panose="020B0604020202020204" pitchFamily="34" charset="0"/>
-              <a:buChar char="•"/>
-              <a:defRPr sz="2800" kern="1200">
+          <a:lstStyle/>
+          <a:p>
+            <a:r>
+              <a:rPr lang="en-US" dirty="0">
                 <a:solidFill>
-                  <a:schemeClr val="tx1"/>
+                  <a:schemeClr val="bg1">
+                    <a:lumMod val="65000"/>
+                  </a:schemeClr>
                 </a:solidFill>
-                <a:latin typeface="+mn-lt"/>
-                <a:ea typeface="+mn-ea"/>
-                <a:cs typeface="+mn-cs"/>
-              </a:defRPr>
-            </a:lvl1pPr>
-            <a:lvl2pPr marL="685800" indent="-228600" algn="l" defTabSz="914400" rtl="0" eaLnBrk="1" latinLnBrk="0" hangingPunct="1">
-              <a:lnSpc>
-                <a:spcPct val="90000"/>
-              </a:lnSpc>
-              <a:spcBef>
-                <a:spcPts val="500"/>
-              </a:spcBef>
-              <a:buFont typeface="Arial" panose="020B0604020202020204" pitchFamily="34" charset="0"/>
-              <a:buChar char="•"/>
-              <a:defRPr sz="2400" kern="1200">
-                <a:solidFill>
-                  <a:schemeClr val="tx1"/>
-                </a:solidFill>
-                <a:latin typeface="+mn-lt"/>
-                <a:ea typeface="+mn-ea"/>
-                <a:cs typeface="+mn-cs"/>
-              </a:defRPr>
-            </a:lvl2pPr>
-            <a:lvl3pPr marL="1143000" indent="-228600" algn="l" defTabSz="914400" rtl="0" eaLnBrk="1" latinLnBrk="0" hangingPunct="1">
-              <a:lnSpc>
-                <a:spcPct val="90000"/>
-              </a:lnSpc>
-              <a:spcBef>
-                <a:spcPts val="500"/>
-              </a:spcBef>
-              <a:buFont typeface="Arial" panose="020B0604020202020204" pitchFamily="34" charset="0"/>
-              <a:buChar char="•"/>
-              <a:defRPr sz="2000" kern="1200">
-                <a:solidFill>
-                  <a:schemeClr val="tx1"/>
-                </a:solidFill>
-                <a:latin typeface="+mn-lt"/>
-                <a:ea typeface="+mn-ea"/>
-                <a:cs typeface="+mn-cs"/>
-              </a:defRPr>
-            </a:lvl3pPr>
-            <a:lvl4pPr marL="1600200" indent="-228600" algn="l" defTabSz="914400" rtl="0" eaLnBrk="1" latinLnBrk="0" hangingPunct="1">
-              <a:lnSpc>
-                <a:spcPct val="90000"/>
-              </a:lnSpc>
-              <a:spcBef>
-                <a:spcPts val="500"/>
-              </a:spcBef>
-              <a:buFont typeface="Arial" panose="020B0604020202020204" pitchFamily="34" charset="0"/>
-              <a:buChar char="•"/>
-              <a:defRPr sz="1800" kern="1200">
-                <a:solidFill>
-                  <a:schemeClr val="tx1"/>
-                </a:solidFill>
-                <a:latin typeface="+mn-lt"/>
-                <a:ea typeface="+mn-ea"/>
-                <a:cs typeface="+mn-cs"/>
-              </a:defRPr>
-            </a:lvl4pPr>
-            <a:lvl5pPr marL="2057400" indent="-228600" algn="l" defTabSz="914400" rtl="0" eaLnBrk="1" latinLnBrk="0" hangingPunct="1">
-              <a:lnSpc>
-                <a:spcPct val="90000"/>
-              </a:lnSpc>
-              <a:spcBef>
-                <a:spcPts val="500"/>
-              </a:spcBef>
-              <a:buFont typeface="Arial" panose="020B0604020202020204" pitchFamily="34" charset="0"/>
-              <a:buChar char="•"/>
-              <a:defRPr sz="1800" kern="1200">
-                <a:solidFill>
-                  <a:schemeClr val="tx1"/>
-                </a:solidFill>
-                <a:latin typeface="+mn-lt"/>
-                <a:ea typeface="+mn-ea"/>
-                <a:cs typeface="+mn-cs"/>
-              </a:defRPr>
-            </a:lvl5pPr>
-            <a:lvl6pPr marL="2514600" indent="-228600" algn="l" defTabSz="914400" rtl="0" eaLnBrk="1" latinLnBrk="0" hangingPunct="1">
-              <a:lnSpc>
-                <a:spcPct val="90000"/>
-              </a:lnSpc>
-              <a:spcBef>
-                <a:spcPts val="500"/>
-              </a:spcBef>
-              <a:buFont typeface="Arial" panose="020B0604020202020204" pitchFamily="34" charset="0"/>
-              <a:buChar char="•"/>
-              <a:defRPr sz="1800" kern="1200">
-                <a:solidFill>
-                  <a:schemeClr val="tx1"/>
-                </a:solidFill>
-                <a:latin typeface="+mn-lt"/>
-                <a:ea typeface="+mn-ea"/>
-                <a:cs typeface="+mn-cs"/>
-              </a:defRPr>
-            </a:lvl6pPr>
-            <a:lvl7pPr marL="2971800" indent="-228600" algn="l" defTabSz="914400" rtl="0" eaLnBrk="1" latinLnBrk="0" hangingPunct="1">
-              <a:lnSpc>
-                <a:spcPct val="90000"/>
-              </a:lnSpc>
-              <a:spcBef>
-                <a:spcPts val="500"/>
-              </a:spcBef>
-              <a:buFont typeface="Arial" panose="020B0604020202020204" pitchFamily="34" charset="0"/>
-              <a:buChar char="•"/>
-              <a:defRPr sz="1800" kern="1200">
-                <a:solidFill>
-                  <a:schemeClr val="tx1"/>
-                </a:solidFill>
-                <a:latin typeface="+mn-lt"/>
-                <a:ea typeface="+mn-ea"/>
-                <a:cs typeface="+mn-cs"/>
-              </a:defRPr>
-            </a:lvl7pPr>
-            <a:lvl8pPr marL="3429000" indent="-228600" algn="l" defTabSz="914400" rtl="0" eaLnBrk="1" latinLnBrk="0" hangingPunct="1">
-              <a:lnSpc>
-                <a:spcPct val="90000"/>
-              </a:lnSpc>
-              <a:spcBef>
-                <a:spcPts val="500"/>
-              </a:spcBef>
-              <a:buFont typeface="Arial" panose="020B0604020202020204" pitchFamily="34" charset="0"/>
-              <a:buChar char="•"/>
-              <a:defRPr sz="1800" kern="1200">
-                <a:solidFill>
-                  <a:schemeClr val="tx1"/>
-                </a:solidFill>
-                <a:latin typeface="+mn-lt"/>
-                <a:ea typeface="+mn-ea"/>
-                <a:cs typeface="+mn-cs"/>
-              </a:defRPr>
-            </a:lvl8pPr>
-            <a:lvl9pPr marL="3886200" indent="-228600" algn="l" defTabSz="914400" rtl="0" eaLnBrk="1" latinLnBrk="0" hangingPunct="1">
-              <a:lnSpc>
-                <a:spcPct val="90000"/>
-              </a:lnSpc>
-              <a:spcBef>
-                <a:spcPts val="500"/>
-              </a:spcBef>
-              <a:buFont typeface="Arial" panose="020B0604020202020204" pitchFamily="34" charset="0"/>
-              <a:buChar char="•"/>
-              <a:defRPr sz="1800" kern="1200">
-                <a:solidFill>
-                  <a:schemeClr val="tx1"/>
-                </a:solidFill>
-                <a:latin typeface="+mn-lt"/>
-                <a:ea typeface="+mn-ea"/>
-                <a:cs typeface="+mn-cs"/>
-              </a:defRPr>
-            </a:lvl9pPr>
-          </a:lstStyle>
+              </a:rPr>
+              <a:t>Agent</a:t>
+            </a:r>
+            <a:endParaRPr lang="it-IT" dirty="0">
+              <a:solidFill>
+                <a:schemeClr val="bg1">
+                  <a:lumMod val="65000"/>
+                </a:schemeClr>
+              </a:solidFill>
+            </a:endParaRPr>
+          </a:p>
+        </p:txBody>
+      </p:sp>
+      <p:sp>
+        <p:nvSpPr>
+          <p:cNvPr id="103" name="TextBox 102">
+            <a:extLst>
+              <a:ext uri="{FF2B5EF4-FFF2-40B4-BE49-F238E27FC236}">
+                <a16:creationId xmlns:a16="http://schemas.microsoft.com/office/drawing/2014/main" id="{867D341E-6258-60E8-DB27-8D9826D2AFD4}"/>
+              </a:ext>
+            </a:extLst>
+          </p:cNvPr>
+          <p:cNvSpPr txBox="1"/>
+          <p:nvPr/>
+        </p:nvSpPr>
+        <p:spPr>
+          <a:xfrm>
+            <a:off x="4426796" y="1856267"/>
+            <a:ext cx="1556901" cy="369332"/>
+          </a:xfrm>
+          <a:prstGeom prst="rect">
+            <a:avLst/>
+          </a:prstGeom>
+          <a:noFill/>
+        </p:spPr>
+        <p:txBody>
+          <a:bodyPr wrap="none" rtlCol="0">
+            <a:spAutoFit/>
+          </a:bodyPr>
+          <a:lstStyle/>
           <a:p>
-            <a:endParaRPr lang="it-IT" sz="2400"/>
-          </a:p>
-          <a:p>
-            <a:endParaRPr lang="it-IT"/>
-          </a:p>
-          <a:p>
-            <a:endParaRPr lang="it-IT"/>
-          </a:p>
-          <a:p>
+            <a:r>
+              <a:rPr lang="en-US" dirty="0"/>
+              <a:t>Shared Model</a:t>
+            </a:r>
             <a:endParaRPr lang="it-IT" dirty="0"/>
           </a:p>
         </p:txBody>
       </p:sp>
+      <p:grpSp>
+        <p:nvGrpSpPr>
+          <p:cNvPr id="110" name="Group 109">
+            <a:extLst>
+              <a:ext uri="{FF2B5EF4-FFF2-40B4-BE49-F238E27FC236}">
+                <a16:creationId xmlns:a16="http://schemas.microsoft.com/office/drawing/2014/main" id="{3D5C6E0B-9A96-A746-4C82-E0C7E71457B2}"/>
+              </a:ext>
+            </a:extLst>
+          </p:cNvPr>
+          <p:cNvGrpSpPr/>
+          <p:nvPr/>
+        </p:nvGrpSpPr>
+        <p:grpSpPr>
+          <a:xfrm>
+            <a:off x="3618156" y="2507234"/>
+            <a:ext cx="3527402" cy="1668946"/>
+            <a:chOff x="3628067" y="2542757"/>
+            <a:chExt cx="3527402" cy="1668946"/>
+          </a:xfrm>
+        </p:grpSpPr>
+        <p:sp>
+          <p:nvSpPr>
+            <p:cNvPr id="6" name="Rectangle: Rounded Corners 5">
+              <a:extLst>
+                <a:ext uri="{FF2B5EF4-FFF2-40B4-BE49-F238E27FC236}">
+                  <a16:creationId xmlns:a16="http://schemas.microsoft.com/office/drawing/2014/main" id="{F8EE5151-E581-FA32-A97F-50220ED3364A}"/>
+                </a:ext>
+              </a:extLst>
+            </p:cNvPr>
+            <p:cNvSpPr/>
+            <p:nvPr/>
+          </p:nvSpPr>
+          <p:spPr>
+            <a:xfrm>
+              <a:off x="3628067" y="2542757"/>
+              <a:ext cx="3527402" cy="1668946"/>
+            </a:xfrm>
+            <a:prstGeom prst="roundRect">
+              <a:avLst/>
+            </a:prstGeom>
+          </p:spPr>
+          <p:style>
+            <a:lnRef idx="2">
+              <a:schemeClr val="accent1">
+                <a:shade val="15000"/>
+              </a:schemeClr>
+            </a:lnRef>
+            <a:fillRef idx="1">
+              <a:schemeClr val="accent1"/>
+            </a:fillRef>
+            <a:effectRef idx="0">
+              <a:schemeClr val="accent1"/>
+            </a:effectRef>
+            <a:fontRef idx="minor">
+              <a:schemeClr val="lt1"/>
+            </a:fontRef>
+          </p:style>
+          <p:txBody>
+            <a:bodyPr rtlCol="0" anchor="t" anchorCtr="0"/>
+            <a:lstStyle/>
+            <a:p>
+              <a:pPr algn="ctr"/>
+              <a:r>
+                <a:rPr lang="en-US" sz="1600" dirty="0"/>
+                <a:t>Actor Model - Gaussian</a:t>
+              </a:r>
+              <a:endParaRPr lang="it-IT" sz="1600" dirty="0"/>
+            </a:p>
+          </p:txBody>
+        </p:sp>
+        <p:pic>
+          <p:nvPicPr>
+            <p:cNvPr id="105" name="Graphic 104">
+              <a:extLst>
+                <a:ext uri="{FF2B5EF4-FFF2-40B4-BE49-F238E27FC236}">
+                  <a16:creationId xmlns:a16="http://schemas.microsoft.com/office/drawing/2014/main" id="{C397CB9D-2F0E-F1C2-BDDF-6B52D42ADFED}"/>
+                </a:ext>
+              </a:extLst>
+            </p:cNvPr>
+            <p:cNvPicPr>
+              <a:picLocks noChangeAspect="1"/>
+            </p:cNvPicPr>
+            <p:nvPr/>
+          </p:nvPicPr>
+          <p:blipFill>
+            <a:blip r:embed="rId7">
+              <a:extLst>
+                <a:ext uri="{96DAC541-7B7A-43D3-8B79-37D633B846F1}">
+                  <asvg:svgBlip xmlns:asvg="http://schemas.microsoft.com/office/drawing/2016/SVG/main" r:embed="rId8"/>
+                </a:ext>
+              </a:extLst>
+            </a:blip>
+            <a:stretch>
+              <a:fillRect/>
+            </a:stretch>
+          </p:blipFill>
+          <p:spPr>
+            <a:xfrm>
+              <a:off x="3833452" y="2925355"/>
+              <a:ext cx="3116632" cy="1134328"/>
+            </a:xfrm>
+            <a:prstGeom prst="rect">
+              <a:avLst/>
+            </a:prstGeom>
+          </p:spPr>
+        </p:pic>
+      </p:grpSp>
+      <p:grpSp>
+        <p:nvGrpSpPr>
+          <p:cNvPr id="111" name="Group 110">
+            <a:extLst>
+              <a:ext uri="{FF2B5EF4-FFF2-40B4-BE49-F238E27FC236}">
+                <a16:creationId xmlns:a16="http://schemas.microsoft.com/office/drawing/2014/main" id="{CC6E2526-6A43-1FA7-E11E-298580A89389}"/>
+              </a:ext>
+            </a:extLst>
+          </p:cNvPr>
+          <p:cNvGrpSpPr/>
+          <p:nvPr/>
+        </p:nvGrpSpPr>
+        <p:grpSpPr>
+          <a:xfrm>
+            <a:off x="3618156" y="4366112"/>
+            <a:ext cx="3527402" cy="1668946"/>
+            <a:chOff x="3618156" y="4399628"/>
+            <a:chExt cx="3527402" cy="1668946"/>
+          </a:xfrm>
+        </p:grpSpPr>
+        <p:sp>
+          <p:nvSpPr>
+            <p:cNvPr id="106" name="Rectangle: Rounded Corners 105">
+              <a:extLst>
+                <a:ext uri="{FF2B5EF4-FFF2-40B4-BE49-F238E27FC236}">
+                  <a16:creationId xmlns:a16="http://schemas.microsoft.com/office/drawing/2014/main" id="{5F8C2DC7-456C-FA46-125D-19174F34536F}"/>
+                </a:ext>
+              </a:extLst>
+            </p:cNvPr>
+            <p:cNvSpPr/>
+            <p:nvPr/>
+          </p:nvSpPr>
+          <p:spPr>
+            <a:xfrm>
+              <a:off x="3618156" y="4399628"/>
+              <a:ext cx="3527402" cy="1668946"/>
+            </a:xfrm>
+            <a:prstGeom prst="roundRect">
+              <a:avLst/>
+            </a:prstGeom>
+          </p:spPr>
+          <p:style>
+            <a:lnRef idx="2">
+              <a:schemeClr val="accent1">
+                <a:shade val="15000"/>
+              </a:schemeClr>
+            </a:lnRef>
+            <a:fillRef idx="1">
+              <a:schemeClr val="accent1"/>
+            </a:fillRef>
+            <a:effectRef idx="0">
+              <a:schemeClr val="accent1"/>
+            </a:effectRef>
+            <a:fontRef idx="minor">
+              <a:schemeClr val="lt1"/>
+            </a:fontRef>
+          </p:style>
+          <p:txBody>
+            <a:bodyPr rtlCol="0" anchor="t" anchorCtr="0"/>
+            <a:lstStyle/>
+            <a:p>
+              <a:pPr algn="ctr"/>
+              <a:r>
+                <a:rPr lang="en-US" sz="1600" dirty="0"/>
+                <a:t>Critic Model - Deterministic</a:t>
+              </a:r>
+              <a:endParaRPr lang="it-IT" sz="1600" dirty="0"/>
+            </a:p>
+          </p:txBody>
+        </p:sp>
+        <p:pic>
+          <p:nvPicPr>
+            <p:cNvPr id="108" name="Graphic 107">
+              <a:extLst>
+                <a:ext uri="{FF2B5EF4-FFF2-40B4-BE49-F238E27FC236}">
+                  <a16:creationId xmlns:a16="http://schemas.microsoft.com/office/drawing/2014/main" id="{DFA2D938-D3F2-5C60-2402-51359C090D24}"/>
+                </a:ext>
+              </a:extLst>
+            </p:cNvPr>
+            <p:cNvPicPr>
+              <a:picLocks noChangeAspect="1"/>
+            </p:cNvPicPr>
+            <p:nvPr/>
+          </p:nvPicPr>
+          <p:blipFill>
+            <a:blip r:embed="rId9">
+              <a:extLst>
+                <a:ext uri="{96DAC541-7B7A-43D3-8B79-37D633B846F1}">
+                  <asvg:svgBlip xmlns:asvg="http://schemas.microsoft.com/office/drawing/2016/SVG/main" r:embed="rId10"/>
+                </a:ext>
+              </a:extLst>
+            </a:blip>
+            <a:stretch>
+              <a:fillRect/>
+            </a:stretch>
+          </p:blipFill>
+          <p:spPr>
+            <a:xfrm>
+              <a:off x="4281216" y="4864532"/>
+              <a:ext cx="2201282" cy="1105482"/>
+            </a:xfrm>
+            <a:prstGeom prst="rect">
+              <a:avLst/>
+            </a:prstGeom>
+          </p:spPr>
+        </p:pic>
+      </p:grpSp>
+      <p:cxnSp>
+        <p:nvCxnSpPr>
+          <p:cNvPr id="113" name="Straight Arrow Connector 112">
+            <a:extLst>
+              <a:ext uri="{FF2B5EF4-FFF2-40B4-BE49-F238E27FC236}">
+                <a16:creationId xmlns:a16="http://schemas.microsoft.com/office/drawing/2014/main" id="{2F8F6A79-9283-29AC-A617-C01D5A692CAC}"/>
+              </a:ext>
+            </a:extLst>
+          </p:cNvPr>
+          <p:cNvCxnSpPr>
+            <a:cxnSpLocks/>
+            <a:stCxn id="8" idx="3"/>
+          </p:cNvCxnSpPr>
+          <p:nvPr/>
+        </p:nvCxnSpPr>
+        <p:spPr>
+          <a:xfrm>
+            <a:off x="7291112" y="4259844"/>
+            <a:ext cx="466774" cy="0"/>
+          </a:xfrm>
+          <a:prstGeom prst="straightConnector1">
+            <a:avLst/>
+          </a:prstGeom>
+          <a:ln>
+            <a:tailEnd type="triangle"/>
+          </a:ln>
+        </p:spPr>
+        <p:style>
+          <a:lnRef idx="2">
+            <a:schemeClr val="dk1"/>
+          </a:lnRef>
+          <a:fillRef idx="0">
+            <a:schemeClr val="dk1"/>
+          </a:fillRef>
+          <a:effectRef idx="1">
+            <a:schemeClr val="dk1"/>
+          </a:effectRef>
+          <a:fontRef idx="minor">
+            <a:schemeClr val="tx1"/>
+          </a:fontRef>
+        </p:style>
+      </p:cxnSp>
+      <p:cxnSp>
+        <p:nvCxnSpPr>
+          <p:cNvPr id="128" name="Straight Arrow Connector 127">
+            <a:extLst>
+              <a:ext uri="{FF2B5EF4-FFF2-40B4-BE49-F238E27FC236}">
+                <a16:creationId xmlns:a16="http://schemas.microsoft.com/office/drawing/2014/main" id="{D60A54A8-E370-04CA-4FF7-6FDFC08B048D}"/>
+              </a:ext>
+            </a:extLst>
+          </p:cNvPr>
+          <p:cNvCxnSpPr>
+            <a:cxnSpLocks/>
+            <a:stCxn id="76" idx="1"/>
+            <a:endCxn id="75" idx="1"/>
+          </p:cNvCxnSpPr>
+          <p:nvPr/>
+        </p:nvCxnSpPr>
+        <p:spPr>
+          <a:xfrm flipV="1">
+            <a:off x="9925952" y="4244505"/>
+            <a:ext cx="298622" cy="1"/>
+          </a:xfrm>
+          <a:prstGeom prst="straightConnector1">
+            <a:avLst/>
+          </a:prstGeom>
+          <a:ln>
+            <a:tailEnd type="triangle"/>
+          </a:ln>
+        </p:spPr>
+        <p:style>
+          <a:lnRef idx="2">
+            <a:schemeClr val="dk1"/>
+          </a:lnRef>
+          <a:fillRef idx="0">
+            <a:schemeClr val="dk1"/>
+          </a:fillRef>
+          <a:effectRef idx="1">
+            <a:schemeClr val="dk1"/>
+          </a:effectRef>
+          <a:fontRef idx="minor">
+            <a:schemeClr val="tx1"/>
+          </a:fontRef>
+        </p:style>
+      </p:cxnSp>
     </p:spTree>
     <p:extLst>
       <p:ext uri="{BB962C8B-B14F-4D97-AF65-F5344CB8AC3E}">

</xml_diff>